<commit_message>
feat(2_triangle): update ppt and code
</commit_message>
<xml_diff>
--- a/lessons/2_triangle/ppt/第二节课.pptx
+++ b/lessons/2_triangle/ppt/第二节课.pptx
@@ -5,10 +5,10 @@
     <p:sldMasterId id="2147483648" r:id="rId1"/>
   </p:sldMasterIdLst>
   <p:notesMasterIdLst>
-    <p:notesMasterId r:id="rId36"/>
+    <p:notesMasterId r:id="rId39"/>
   </p:notesMasterIdLst>
   <p:handoutMasterIdLst>
-    <p:handoutMasterId r:id="rId37"/>
+    <p:handoutMasterId r:id="rId40"/>
   </p:handoutMasterIdLst>
   <p:sldIdLst>
     <p:sldId id="307" r:id="rId2"/>
@@ -31,25 +31,28 @@
     <p:sldId id="395" r:id="rId19"/>
     <p:sldId id="403" r:id="rId20"/>
     <p:sldId id="404" r:id="rId21"/>
-    <p:sldId id="405" r:id="rId22"/>
-    <p:sldId id="378" r:id="rId23"/>
-    <p:sldId id="382" r:id="rId24"/>
-    <p:sldId id="407" r:id="rId25"/>
-    <p:sldId id="388" r:id="rId26"/>
-    <p:sldId id="423" r:id="rId27"/>
+    <p:sldId id="333" r:id="rId22"/>
+    <p:sldId id="424" r:id="rId23"/>
+    <p:sldId id="354" r:id="rId24"/>
+    <p:sldId id="378" r:id="rId25"/>
+    <p:sldId id="382" r:id="rId26"/>
+    <p:sldId id="407" r:id="rId27"/>
     <p:sldId id="406" r:id="rId28"/>
-    <p:sldId id="399" r:id="rId29"/>
-    <p:sldId id="400" r:id="rId30"/>
-    <p:sldId id="314" r:id="rId31"/>
-    <p:sldId id="409" r:id="rId32"/>
-    <p:sldId id="410" r:id="rId33"/>
-    <p:sldId id="420" r:id="rId34"/>
-    <p:sldId id="316" r:id="rId35"/>
+    <p:sldId id="426" r:id="rId29"/>
+    <p:sldId id="388" r:id="rId30"/>
+    <p:sldId id="399" r:id="rId31"/>
+    <p:sldId id="400" r:id="rId32"/>
+    <p:sldId id="314" r:id="rId33"/>
+    <p:sldId id="409" r:id="rId34"/>
+    <p:sldId id="410" r:id="rId35"/>
+    <p:sldId id="425" r:id="rId36"/>
+    <p:sldId id="420" r:id="rId37"/>
+    <p:sldId id="316" r:id="rId38"/>
   </p:sldIdLst>
   <p:sldSz cx="12192000" cy="6858000"/>
   <p:notesSz cx="6858000" cy="9144000"/>
   <p:custDataLst>
-    <p:tags r:id="rId38"/>
+    <p:tags r:id="rId41"/>
   </p:custDataLst>
   <p:defaultTextStyle>
     <a:defPPr>
@@ -7080,35 +7083,35 @@
           <a:p>
             <a:pPr lvl="0"/>
             <a:r>
-              <a:rPr>
+              <a:rPr dirty="0" err="1">
                 <a:sym typeface="+mn-ea"/>
               </a:rPr>
               <a:t>WebGPU</a:t>
             </a:r>
             <a:r>
-              <a:rPr lang="zh-CN">
+              <a:rPr lang="zh-CN" dirty="0">
                 <a:sym typeface="+mn-ea"/>
               </a:rPr>
               <a:t>相比</a:t>
             </a:r>
             <a:r>
-              <a:rPr lang="en-US" altLang="zh-CN">
+              <a:rPr lang="en-US" altLang="zh-CN" dirty="0">
                 <a:sym typeface="+mn-ea"/>
               </a:rPr>
               <a:t>WebGL</a:t>
             </a:r>
             <a:r>
-              <a:rPr lang="zh-CN" altLang="en-US">
+              <a:rPr lang="zh-CN" altLang="en-US" dirty="0">
                 <a:sym typeface="+mn-ea"/>
               </a:rPr>
               <a:t>有什么优势？</a:t>
             </a:r>
-            <a:endParaRPr lang="en-US" altLang="zh-CN">
+            <a:endParaRPr lang="en-US" altLang="zh-CN" dirty="0">
               <a:sym typeface="+mn-ea"/>
             </a:endParaRPr>
           </a:p>
           <a:p>
-            <a:endParaRPr lang="zh-CN" altLang="en-US"/>
+            <a:endParaRPr lang="zh-CN" altLang="en-US" dirty="0"/>
           </a:p>
         </p:txBody>
       </p:sp>
@@ -9158,12 +9161,12 @@
       </p:sp>
       <p:sp>
         <p:nvSpPr>
-          <p:cNvPr id="3" name="文本占位符 2"/>
+          <p:cNvPr id="4" name="内容占位符 3"/>
           <p:cNvSpPr>
             <a:spLocks noGrp="1"/>
           </p:cNvSpPr>
           <p:nvPr>
-            <p:ph type="body" idx="1"/>
+            <p:ph sz="half" idx="2"/>
           </p:nvPr>
         </p:nvSpPr>
         <p:spPr/>
@@ -9171,29 +9174,112 @@
           <a:bodyPr/>
           <a:lstStyle/>
           <a:p>
-            <a:pPr marL="342900" indent="-342900" algn="l">
+            <a:pPr marL="285750" indent="-285750">
               <a:buFont typeface="Arial" panose="020B0604020202020204" pitchFamily="34" charset="0"/>
               <a:buChar char="•"/>
             </a:pPr>
             <a:r>
-              <a:rPr lang="zh-CN" altLang="en-US" b="0">
-                <a:sym typeface="+mn-ea"/>
-              </a:rPr>
-              <a:t>配置</a:t>
-            </a:r>
-            <a:r>
-              <a:rPr lang="en-US" altLang="zh-CN" b="0">
-                <a:sym typeface="+mn-ea"/>
-              </a:rPr>
-              <a:t>shader VS Code</a:t>
-            </a:r>
-            <a:r>
-              <a:rPr b="0">
-                <a:sym typeface="+mn-ea"/>
-              </a:rPr>
-              <a:t>插件</a:t>
-            </a:r>
-            <a:endParaRPr lang="zh-CN" altLang="en-US" b="0"/>
+              <a:rPr lang="en-US" altLang="zh-CN" dirty="0">
+                <a:sym typeface="+mn-ea"/>
+              </a:rPr>
+              <a:t>Shader languages support for VS Code</a:t>
+            </a:r>
+            <a:r>
+              <a:rPr lang="zh-CN" altLang="en-US" dirty="0">
+                <a:sym typeface="+mn-ea"/>
+              </a:rPr>
+              <a:t>（高亮）</a:t>
+            </a:r>
+          </a:p>
+          <a:p>
+            <a:pPr lvl="0"/>
+            <a:br>
+              <a:rPr lang="en-US" altLang="zh-CN" dirty="0">
+                <a:sym typeface="+mn-ea"/>
+              </a:rPr>
+            </a:br>
+            <a:br>
+              <a:rPr dirty="0"/>
+            </a:br>
+            <a:br>
+              <a:rPr dirty="0"/>
+            </a:br>
+            <a:br>
+              <a:rPr lang="en-US" altLang="zh-CN" dirty="0"/>
+            </a:br>
+            <a:endParaRPr lang="en-US" altLang="zh-CN" dirty="0"/>
+          </a:p>
+          <a:p>
+            <a:pPr>
+              <a:buFont typeface="Arial" panose="020B0604020202020204" pitchFamily="34" charset="0"/>
+            </a:pPr>
+            <a:endParaRPr lang="en-US" altLang="zh-CN" dirty="0"/>
+          </a:p>
+          <a:p>
+            <a:pPr>
+              <a:buFont typeface="Arial" panose="020B0604020202020204" pitchFamily="34" charset="0"/>
+            </a:pPr>
+            <a:endParaRPr lang="zh-CN" altLang="en-US" dirty="0"/>
+          </a:p>
+          <a:p>
+            <a:endParaRPr lang="zh-CN" altLang="en-US" dirty="0"/>
+          </a:p>
+        </p:txBody>
+      </p:sp>
+    </p:spTree>
+    <p:custDataLst>
+      <p:tags r:id="rId1"/>
+    </p:custDataLst>
+  </p:cSld>
+  <p:clrMapOvr>
+    <a:masterClrMapping/>
+  </p:clrMapOvr>
+</p:sld>
+</file>
+
+<file path=ppt/slides/slide22.xml><?xml version="1.0" encoding="utf-8"?>
+<p:sld xmlns:a="http://schemas.openxmlformats.org/drawingml/2006/main" xmlns:r="http://schemas.openxmlformats.org/officeDocument/2006/relationships" xmlns:p="http://schemas.openxmlformats.org/presentationml/2006/main">
+  <p:cSld>
+    <p:spTree>
+      <p:nvGrpSpPr>
+        <p:cNvPr id="1" name=""/>
+        <p:cNvGrpSpPr/>
+        <p:nvPr/>
+      </p:nvGrpSpPr>
+      <p:grpSpPr>
+        <a:xfrm>
+          <a:off x="0" y="0"/>
+          <a:ext cx="0" cy="0"/>
+          <a:chOff x="0" y="0"/>
+          <a:chExt cx="0" cy="0"/>
+        </a:xfrm>
+      </p:grpSpPr>
+      <p:sp>
+        <p:nvSpPr>
+          <p:cNvPr id="2" name="标题 1"/>
+          <p:cNvSpPr>
+            <a:spLocks noGrp="1"/>
+          </p:cNvSpPr>
+          <p:nvPr>
+            <p:ph type="title"/>
+          </p:nvPr>
+        </p:nvSpPr>
+        <p:spPr/>
+        <p:txBody>
+          <a:bodyPr/>
+          <a:lstStyle/>
+          <a:p>
+            <a:r>
+              <a:rPr lang="zh-CN" altLang="en-US" dirty="0"/>
+              <a:t>任务</a:t>
+            </a:r>
+            <a:r>
+              <a:rPr lang="zh-CN" altLang="en-US" dirty="0">
+                <a:sym typeface="+mn-ea"/>
+              </a:rPr>
+              <a:t>：准备开发环境</a:t>
+            </a:r>
+            <a:endParaRPr lang="zh-CN" altLang="en-US" dirty="0"/>
           </a:p>
         </p:txBody>
       </p:sp>
@@ -9212,33 +9298,78 @@
           <a:bodyPr/>
           <a:lstStyle/>
           <a:p>
+            <a:pPr marL="285750" indent="-285750">
+              <a:buFont typeface="Arial" panose="020B0604020202020204" pitchFamily="34" charset="0"/>
+              <a:buChar char="•"/>
+            </a:pPr>
+            <a:r>
+              <a:rPr lang="zh-CN" altLang="en-US" dirty="0"/>
+              <a:t>Shaderc GLSL Linter（自动编译检查）</a:t>
+            </a:r>
+            <a:endParaRPr lang="en-US" altLang="zh-CN" dirty="0"/>
+          </a:p>
+          <a:p>
             <a:pPr marL="742950" lvl="1" indent="-285750">
               <a:buFont typeface="Arial" panose="020B0604020202020204" pitchFamily="34" charset="0"/>
               <a:buChar char="•"/>
             </a:pPr>
             <a:r>
-              <a:rPr lang="en-US" altLang="zh-CN">
-                <a:sym typeface="+mn-ea"/>
-              </a:rPr>
-              <a:t>Shader languages support for VS Code</a:t>
+              <a:rPr lang="zh-CN" altLang="en-US" dirty="0">
+                <a:hlinkClick r:id="rId3" action="ppaction://hlinkfile"/>
+              </a:rPr>
+              <a:t>下载</a:t>
+            </a:r>
+            <a:r>
+              <a:rPr lang="en-US" altLang="zh-CN" dirty="0">
+                <a:hlinkClick r:id="rId3" action="ppaction://hlinkfile"/>
+              </a:rPr>
+              <a:t>shaderc</a:t>
+            </a:r>
+            <a:r>
+              <a:rPr dirty="0">
+                <a:hlinkClick r:id="rId3" action="ppaction://hlinkfile"/>
+              </a:rPr>
+              <a:t>，</a:t>
+            </a:r>
+            <a:r>
+              <a:rPr dirty="0"/>
+              <a:t>选择windows，解压；</a:t>
             </a:r>
             <a:br>
-              <a:rPr lang="en-US" altLang="zh-CN">
-                <a:sym typeface="+mn-ea"/>
-              </a:rPr>
+              <a:rPr lang="en-US" dirty="0"/>
             </a:br>
             <a:r>
-              <a:rPr lang="en-US" altLang="zh-CN">
-                <a:sym typeface="+mn-ea"/>
-              </a:rPr>
-              <a:t>（</a:t>
-            </a:r>
-            <a:r>
-              <a:rPr>
-                <a:sym typeface="+mn-ea"/>
-              </a:rPr>
-              <a:t>高亮）</a:t>
-            </a:r>
+              <a:rPr lang="zh-CN" altLang="en-US" dirty="0"/>
+              <a:t>（在</a:t>
+            </a:r>
+            <a:r>
+              <a:rPr lang="en" altLang="zh-CN" dirty="0">
+                <a:hlinkClick r:id="rId4"/>
+              </a:rPr>
+              <a:t>issue</a:t>
+            </a:r>
+            <a:r>
+              <a:rPr lang="en" altLang="zh-CN" dirty="0"/>
+              <a:t> -&gt;</a:t>
+            </a:r>
+            <a:r>
+              <a:rPr lang="en" altLang="zh-CN" dirty="0">
+                <a:hlinkClick r:id="rId5"/>
+              </a:rPr>
+              <a:t>cloud storage</a:t>
+            </a:r>
+            <a:r>
+              <a:rPr lang="zh-CN" altLang="en" dirty="0"/>
+              <a:t>中</a:t>
+            </a:r>
+            <a:r>
+              <a:rPr lang="zh-CN" altLang="en-US" dirty="0"/>
+              <a:t>，可以找到历史版本）</a:t>
+            </a:r>
+            <a:br>
+              <a:rPr lang="en-US" dirty="0"/>
+            </a:br>
+            <a:endParaRPr lang="en-US" dirty="0"/>
           </a:p>
           <a:p>
             <a:pPr marL="742950" lvl="1" indent="-285750">
@@ -9246,61 +9377,20 @@
               <a:buChar char="•"/>
             </a:pPr>
             <a:r>
-              <a:rPr lang="zh-CN" altLang="en-US"/>
+              <a:rPr dirty="0"/>
+              <a:t>安装</a:t>
+            </a:r>
+            <a:r>
+              <a:rPr dirty="0">
+                <a:sym typeface="+mn-ea"/>
+              </a:rPr>
               <a:t>Shaderc GLSL Linter</a:t>
             </a:r>
-            <a:br>
-              <a:rPr lang="zh-CN" altLang="en-US"/>
-            </a:br>
-            <a:r>
-              <a:rPr lang="zh-CN" altLang="en-US">
-                <a:hlinkClick r:id="rId3" action="ppaction://hlinkfile"/>
-              </a:rPr>
-              <a:t>下载</a:t>
-            </a:r>
-            <a:r>
-              <a:rPr lang="en-US" altLang="zh-CN">
-                <a:hlinkClick r:id="rId3" action="ppaction://hlinkfile"/>
-              </a:rPr>
-              <a:t>shaderc</a:t>
-            </a:r>
-            <a:r>
-              <a:rPr>
-                <a:hlinkClick r:id="rId3" action="ppaction://hlinkfile"/>
-              </a:rPr>
-              <a:t>，</a:t>
-            </a:r>
-            <a:r>
-              <a:t>选择windows，解压；</a:t>
-            </a:r>
-            <a:br/>
-            <a:r>
-              <a:t>安装</a:t>
-            </a:r>
-            <a:r>
-              <a:rPr>
-                <a:sym typeface="+mn-ea"/>
-              </a:rPr>
-              <a:t>Shaderc GLSL Linter</a:t>
-            </a:r>
-            <a:r>
+            <a:r>
+              <a:rPr dirty="0"/>
               <a:t>插件；</a:t>
             </a:r>
-            <a:br/>
-            <a:r>
-              <a:rPr lang="en-US" altLang="zh-CN"/>
-              <a:t>setting.json:s"shaderc-lint.glslcPath": "your-install-dir/bin/glslc",</a:t>
-            </a:r>
-            <a:br>
-              <a:rPr lang="en-US" altLang="zh-CN"/>
-            </a:br>
-            <a:r>
-              <a:t>"shaderc-lint.glslcArgs": "--target-env=vulkan1.2",</a:t>
-            </a:r>
-            <a:br/>
-            <a:r>
-              <a:t>（自动编译检查）</a:t>
-            </a:r>
+            <a:endParaRPr lang="en-US" dirty="0"/>
           </a:p>
           <a:p>
             <a:pPr marL="742950" lvl="1" indent="-285750">
@@ -9308,50 +9398,75 @@
               <a:buChar char="•"/>
             </a:pPr>
             <a:r>
-              <a:t>Clang-Format</a:t>
-            </a:r>
-            <a:br/>
-            <a:r>
-              <a:t>npm install -g clang-format</a:t>
-            </a:r>
-            <a:br/>
-            <a:r>
-              <a:t>安装</a:t>
-            </a:r>
-            <a:r>
-              <a:rPr>
-                <a:sym typeface="+mn-ea"/>
-              </a:rPr>
-              <a:t>Clang-Format</a:t>
-            </a:r>
-            <a:r>
-              <a:t>插件</a:t>
-            </a:r>
-            <a:br/>
-            <a:r>
-              <a:t>（格式化）</a:t>
-            </a:r>
-            <a:br/>
-            <a:br/>
+              <a:rPr lang="zh-CN" altLang="en-US" dirty="0"/>
+              <a:t>设置它：</a:t>
+            </a:r>
             <a:br>
-              <a:rPr lang="en-US" altLang="zh-CN"/>
+              <a:rPr lang="en-US" altLang="zh-CN" dirty="0"/>
             </a:br>
-            <a:endParaRPr lang="en-US" altLang="zh-CN"/>
+            <a:r>
+              <a:rPr lang="en-US" altLang="zh-CN" dirty="0"/>
+              <a:t>"</a:t>
+            </a:r>
+            <a:r>
+              <a:rPr lang="en-US" altLang="zh-CN" dirty="0" err="1"/>
+              <a:t>glslcPath</a:t>
+            </a:r>
+            <a:r>
+              <a:rPr lang="en-US" altLang="zh-CN" dirty="0"/>
+              <a:t>": "your-install-</a:t>
+            </a:r>
+            <a:r>
+              <a:rPr lang="en-US" altLang="zh-CN" dirty="0" err="1"/>
+              <a:t>dir</a:t>
+            </a:r>
+            <a:r>
+              <a:rPr lang="en-US" altLang="zh-CN" dirty="0"/>
+              <a:t>/bin/</a:t>
+            </a:r>
+            <a:r>
+              <a:rPr lang="en-US" altLang="zh-CN" dirty="0" err="1"/>
+              <a:t>glslc</a:t>
+            </a:r>
+            <a:r>
+              <a:rPr lang="en-US" altLang="zh-CN" dirty="0"/>
+              <a:t>",</a:t>
+            </a:r>
+            <a:br>
+              <a:rPr lang="en-US" altLang="zh-CN" dirty="0"/>
+            </a:br>
+            <a:r>
+              <a:rPr dirty="0"/>
+              <a:t>"glslcArgs": "--target-env=vulkan1.2",</a:t>
+            </a:r>
+            <a:br>
+              <a:rPr dirty="0"/>
+            </a:br>
+            <a:br>
+              <a:rPr dirty="0"/>
+            </a:br>
+            <a:br>
+              <a:rPr dirty="0"/>
+            </a:br>
+            <a:br>
+              <a:rPr lang="en-US" altLang="zh-CN" dirty="0"/>
+            </a:br>
+            <a:endParaRPr lang="en-US" altLang="zh-CN" dirty="0"/>
           </a:p>
           <a:p>
             <a:pPr>
               <a:buFont typeface="Arial" panose="020B0604020202020204" pitchFamily="34" charset="0"/>
             </a:pPr>
-            <a:endParaRPr lang="en-US" altLang="zh-CN"/>
+            <a:endParaRPr lang="en-US" altLang="zh-CN" dirty="0"/>
           </a:p>
           <a:p>
             <a:pPr>
               <a:buFont typeface="Arial" panose="020B0604020202020204" pitchFamily="34" charset="0"/>
             </a:pPr>
-            <a:endParaRPr lang="zh-CN" altLang="en-US"/>
-          </a:p>
-          <a:p>
-            <a:endParaRPr lang="zh-CN" altLang="en-US"/>
+            <a:endParaRPr lang="zh-CN" altLang="en-US" dirty="0"/>
+          </a:p>
+          <a:p>
+            <a:endParaRPr lang="zh-CN" altLang="en-US" dirty="0"/>
           </a:p>
         </p:txBody>
       </p:sp>
@@ -9359,6 +9474,11 @@
     <p:custDataLst>
       <p:tags r:id="rId1"/>
     </p:custDataLst>
+    <p:extLst>
+      <p:ext uri="{BB962C8B-B14F-4D97-AF65-F5344CB8AC3E}">
+        <p14:creationId xmlns:p14="http://schemas.microsoft.com/office/powerpoint/2010/main" val="3725555034"/>
+      </p:ext>
+    </p:extLst>
   </p:cSld>
   <p:clrMapOvr>
     <a:masterClrMapping/>
@@ -9399,7 +9519,7 @@
                                         <p:tgtEl>
                                           <p:spTgt spid="4">
                                             <p:txEl>
-                                              <p:pRg st="0" end="0"/>
+                                              <p:pRg st="1" end="1"/>
                                             </p:txEl>
                                           </p:spTgt>
                                         </p:tgtEl>
@@ -9448,7 +9568,7 @@
                                         <p:tgtEl>
                                           <p:spTgt spid="4">
                                             <p:txEl>
-                                              <p:pRg st="1" end="1"/>
+                                              <p:pRg st="2" end="2"/>
                                             </p:txEl>
                                           </p:spTgt>
                                         </p:tgtEl>
@@ -9497,7 +9617,7 @@
                                         <p:tgtEl>
                                           <p:spTgt spid="4">
                                             <p:txEl>
-                                              <p:pRg st="2" end="2"/>
+                                              <p:pRg st="3" end="3"/>
                                             </p:txEl>
                                           </p:spTgt>
                                         </p:tgtEl>
@@ -9543,7 +9663,7 @@
 </p:sld>
 </file>
 
-<file path=ppt/slides/slide22.xml><?xml version="1.0" encoding="utf-8"?>
+<file path=ppt/slides/slide23.xml><?xml version="1.0" encoding="utf-8"?>
 <p:sld xmlns:a="http://schemas.openxmlformats.org/drawingml/2006/main" xmlns:r="http://schemas.openxmlformats.org/officeDocument/2006/relationships" xmlns:p="http://schemas.openxmlformats.org/presentationml/2006/main">
   <p:cSld>
     <p:spTree>
@@ -9576,37 +9696,397 @@
           <a:lstStyle/>
           <a:p>
             <a:r>
-              <a:rPr>
+              <a:rPr lang="zh-CN" altLang="en-US" dirty="0"/>
+              <a:t>任务：准备开发环境</a:t>
+            </a:r>
+          </a:p>
+        </p:txBody>
+      </p:sp>
+      <p:sp>
+        <p:nvSpPr>
+          <p:cNvPr id="4" name="内容占位符 3"/>
+          <p:cNvSpPr>
+            <a:spLocks noGrp="1"/>
+          </p:cNvSpPr>
+          <p:nvPr>
+            <p:ph sz="half" idx="2"/>
+          </p:nvPr>
+        </p:nvSpPr>
+        <p:spPr/>
+        <p:txBody>
+          <a:bodyPr/>
+          <a:lstStyle/>
+          <a:p>
+            <a:pPr marL="285750" lvl="0" indent="-285750">
+              <a:buFont typeface="Arial" panose="020B0604020202020204" pitchFamily="34" charset="0"/>
+              <a:buChar char="•"/>
+            </a:pPr>
+            <a:r>
+              <a:rPr dirty="0"/>
+              <a:t>Clang-Format</a:t>
+            </a:r>
+            <a:r>
+              <a:rPr lang="zh-CN" altLang="en-US" dirty="0"/>
+              <a:t> （格式化）</a:t>
+            </a:r>
+            <a:endParaRPr lang="en-US" dirty="0"/>
+          </a:p>
+          <a:p>
+            <a:pPr marL="742950" lvl="1" indent="-285750">
+              <a:buFont typeface="Arial" panose="020B0604020202020204" pitchFamily="34" charset="0"/>
+              <a:buChar char="•"/>
+            </a:pPr>
+            <a:r>
+              <a:rPr dirty="0"/>
+              <a:t>npm install -g clang-format</a:t>
+            </a:r>
+            <a:endParaRPr lang="en-US" dirty="0"/>
+          </a:p>
+          <a:p>
+            <a:pPr marL="742950" lvl="1" indent="-285750">
+              <a:buFont typeface="Arial" panose="020B0604020202020204" pitchFamily="34" charset="0"/>
+              <a:buChar char="•"/>
+            </a:pPr>
+            <a:r>
+              <a:rPr dirty="0"/>
+              <a:t>安装</a:t>
+            </a:r>
+            <a:r>
+              <a:rPr dirty="0">
+                <a:sym typeface="+mn-ea"/>
+              </a:rPr>
+              <a:t>Clang-Format</a:t>
+            </a:r>
+            <a:r>
+              <a:rPr dirty="0"/>
+              <a:t>插件</a:t>
+            </a:r>
+            <a:endParaRPr lang="en-US" dirty="0"/>
+          </a:p>
+          <a:p>
+            <a:pPr marL="742950" lvl="1" indent="-285750">
+              <a:buFont typeface="Arial" panose="020B0604020202020204" pitchFamily="34" charset="0"/>
+              <a:buChar char="•"/>
+            </a:pPr>
+            <a:r>
+              <a:rPr lang="zh-CN" altLang="en-US" dirty="0"/>
+              <a:t>设置它</a:t>
+            </a:r>
+            <a:r>
+              <a:rPr lang="en-US" altLang="zh-CN" dirty="0"/>
+              <a:t>:</a:t>
+            </a:r>
+            <a:br>
+              <a:rPr lang="en-US" altLang="zh-CN" dirty="0"/>
+            </a:br>
+            <a:r>
+              <a:rPr lang="en-US" altLang="zh-CN" dirty="0"/>
+              <a:t>"executable": "your-global-</a:t>
+            </a:r>
+            <a:r>
+              <a:rPr lang="en-US" altLang="zh-CN" dirty="0" err="1"/>
+              <a:t>node_module</a:t>
+            </a:r>
+            <a:r>
+              <a:rPr lang="en-US" altLang="zh-CN" dirty="0"/>
+              <a:t>-</a:t>
+            </a:r>
+            <a:r>
+              <a:rPr lang="en-US" altLang="zh-CN" dirty="0" err="1"/>
+              <a:t>dir</a:t>
+            </a:r>
+            <a:r>
+              <a:rPr lang="en-US" altLang="zh-CN" dirty="0"/>
+              <a:t>/clang-format/bin/darwin_x64/clang-format"</a:t>
+            </a:r>
+            <a:br>
+              <a:rPr dirty="0"/>
+            </a:br>
+            <a:br>
+              <a:rPr dirty="0"/>
+            </a:br>
+            <a:br>
+              <a:rPr dirty="0"/>
+            </a:br>
+            <a:br>
+              <a:rPr lang="en-US" altLang="zh-CN" dirty="0"/>
+            </a:br>
+            <a:endParaRPr lang="en-US" altLang="zh-CN" dirty="0"/>
+          </a:p>
+          <a:p>
+            <a:pPr>
+              <a:buFont typeface="Arial" panose="020B0604020202020204" pitchFamily="34" charset="0"/>
+            </a:pPr>
+            <a:endParaRPr lang="en-US" altLang="zh-CN" dirty="0"/>
+          </a:p>
+          <a:p>
+            <a:pPr>
+              <a:buFont typeface="Arial" panose="020B0604020202020204" pitchFamily="34" charset="0"/>
+            </a:pPr>
+            <a:endParaRPr lang="zh-CN" altLang="en-US" dirty="0"/>
+          </a:p>
+          <a:p>
+            <a:endParaRPr lang="zh-CN" altLang="en-US" dirty="0"/>
+          </a:p>
+        </p:txBody>
+      </p:sp>
+    </p:spTree>
+    <p:custDataLst>
+      <p:tags r:id="rId1"/>
+    </p:custDataLst>
+    <p:extLst>
+      <p:ext uri="{BB962C8B-B14F-4D97-AF65-F5344CB8AC3E}">
+        <p14:creationId xmlns:p14="http://schemas.microsoft.com/office/powerpoint/2010/main" val="2870835894"/>
+      </p:ext>
+    </p:extLst>
+  </p:cSld>
+  <p:clrMapOvr>
+    <a:masterClrMapping/>
+  </p:clrMapOvr>
+  <p:timing>
+    <p:tnLst>
+      <p:par>
+        <p:cTn id="1" dur="indefinite" restart="never" nodeType="tmRoot">
+          <p:childTnLst>
+            <p:seq concurrent="1" nextAc="seek">
+              <p:cTn id="2" dur="indefinite" nodeType="mainSeq">
+                <p:childTnLst>
+                  <p:par>
+                    <p:cTn id="3" fill="hold">
+                      <p:stCondLst>
+                        <p:cond delay="indefinite"/>
+                      </p:stCondLst>
+                      <p:childTnLst>
+                        <p:par>
+                          <p:cTn id="4" fill="hold">
+                            <p:stCondLst>
+                              <p:cond delay="0"/>
+                            </p:stCondLst>
+                            <p:childTnLst>
+                              <p:par>
+                                <p:cTn id="5" presetID="1" presetClass="entr" presetSubtype="0" fill="hold" nodeType="clickEffect">
+                                  <p:stCondLst>
+                                    <p:cond delay="0"/>
+                                  </p:stCondLst>
+                                  <p:childTnLst>
+                                    <p:set>
+                                      <p:cBhvr>
+                                        <p:cTn id="6" dur="1" fill="hold">
+                                          <p:stCondLst>
+                                            <p:cond delay="0"/>
+                                          </p:stCondLst>
+                                        </p:cTn>
+                                        <p:tgtEl>
+                                          <p:spTgt spid="4">
+                                            <p:txEl>
+                                              <p:pRg st="1" end="1"/>
+                                            </p:txEl>
+                                          </p:spTgt>
+                                        </p:tgtEl>
+                                        <p:attrNameLst>
+                                          <p:attrName>style.visibility</p:attrName>
+                                        </p:attrNameLst>
+                                      </p:cBhvr>
+                                      <p:to>
+                                        <p:strVal val="visible"/>
+                                      </p:to>
+                                    </p:set>
+                                  </p:childTnLst>
+                                </p:cTn>
+                              </p:par>
+                            </p:childTnLst>
+                          </p:cTn>
+                        </p:par>
+                      </p:childTnLst>
+                    </p:cTn>
+                  </p:par>
+                  <p:par>
+                    <p:cTn id="7" fill="hold">
+                      <p:stCondLst>
+                        <p:cond delay="indefinite"/>
+                      </p:stCondLst>
+                      <p:childTnLst>
+                        <p:par>
+                          <p:cTn id="8" fill="hold">
+                            <p:stCondLst>
+                              <p:cond delay="0"/>
+                            </p:stCondLst>
+                            <p:childTnLst>
+                              <p:par>
+                                <p:cTn id="9" presetID="1" presetClass="entr" presetSubtype="0" fill="hold" nodeType="clickEffect">
+                                  <p:stCondLst>
+                                    <p:cond delay="0"/>
+                                  </p:stCondLst>
+                                  <p:childTnLst>
+                                    <p:set>
+                                      <p:cBhvr>
+                                        <p:cTn id="10" dur="1" fill="hold">
+                                          <p:stCondLst>
+                                            <p:cond delay="0"/>
+                                          </p:stCondLst>
+                                        </p:cTn>
+                                        <p:tgtEl>
+                                          <p:spTgt spid="4">
+                                            <p:txEl>
+                                              <p:pRg st="2" end="2"/>
+                                            </p:txEl>
+                                          </p:spTgt>
+                                        </p:tgtEl>
+                                        <p:attrNameLst>
+                                          <p:attrName>style.visibility</p:attrName>
+                                        </p:attrNameLst>
+                                      </p:cBhvr>
+                                      <p:to>
+                                        <p:strVal val="visible"/>
+                                      </p:to>
+                                    </p:set>
+                                  </p:childTnLst>
+                                </p:cTn>
+                              </p:par>
+                            </p:childTnLst>
+                          </p:cTn>
+                        </p:par>
+                      </p:childTnLst>
+                    </p:cTn>
+                  </p:par>
+                  <p:par>
+                    <p:cTn id="11" fill="hold">
+                      <p:stCondLst>
+                        <p:cond delay="indefinite"/>
+                      </p:stCondLst>
+                      <p:childTnLst>
+                        <p:par>
+                          <p:cTn id="12" fill="hold">
+                            <p:stCondLst>
+                              <p:cond delay="0"/>
+                            </p:stCondLst>
+                            <p:childTnLst>
+                              <p:par>
+                                <p:cTn id="13" presetID="1" presetClass="entr" presetSubtype="0" fill="hold" nodeType="clickEffect">
+                                  <p:stCondLst>
+                                    <p:cond delay="0"/>
+                                  </p:stCondLst>
+                                  <p:childTnLst>
+                                    <p:set>
+                                      <p:cBhvr>
+                                        <p:cTn id="14" dur="1" fill="hold">
+                                          <p:stCondLst>
+                                            <p:cond delay="0"/>
+                                          </p:stCondLst>
+                                        </p:cTn>
+                                        <p:tgtEl>
+                                          <p:spTgt spid="4">
+                                            <p:txEl>
+                                              <p:pRg st="3" end="3"/>
+                                            </p:txEl>
+                                          </p:spTgt>
+                                        </p:tgtEl>
+                                        <p:attrNameLst>
+                                          <p:attrName>style.visibility</p:attrName>
+                                        </p:attrNameLst>
+                                      </p:cBhvr>
+                                      <p:to>
+                                        <p:strVal val="visible"/>
+                                      </p:to>
+                                    </p:set>
+                                  </p:childTnLst>
+                                </p:cTn>
+                              </p:par>
+                            </p:childTnLst>
+                          </p:cTn>
+                        </p:par>
+                      </p:childTnLst>
+                    </p:cTn>
+                  </p:par>
+                </p:childTnLst>
+              </p:cTn>
+              <p:prevCondLst>
+                <p:cond evt="onPrev" delay="0">
+                  <p:tgtEl>
+                    <p:sldTgt/>
+                  </p:tgtEl>
+                </p:cond>
+              </p:prevCondLst>
+              <p:nextCondLst>
+                <p:cond evt="onNext" delay="0">
+                  <p:tgtEl>
+                    <p:sldTgt/>
+                  </p:tgtEl>
+                </p:cond>
+              </p:nextCondLst>
+            </p:seq>
+          </p:childTnLst>
+        </p:cTn>
+      </p:par>
+    </p:tnLst>
+  </p:timing>
+</p:sld>
+</file>
+
+<file path=ppt/slides/slide24.xml><?xml version="1.0" encoding="utf-8"?>
+<p:sld xmlns:a="http://schemas.openxmlformats.org/drawingml/2006/main" xmlns:r="http://schemas.openxmlformats.org/officeDocument/2006/relationships" xmlns:p="http://schemas.openxmlformats.org/presentationml/2006/main">
+  <p:cSld>
+    <p:spTree>
+      <p:nvGrpSpPr>
+        <p:cNvPr id="1" name=""/>
+        <p:cNvGrpSpPr/>
+        <p:nvPr/>
+      </p:nvGrpSpPr>
+      <p:grpSpPr>
+        <a:xfrm>
+          <a:off x="0" y="0"/>
+          <a:ext cx="0" cy="0"/>
+          <a:chOff x="0" y="0"/>
+          <a:chExt cx="0" cy="0"/>
+        </a:xfrm>
+      </p:grpSpPr>
+      <p:sp>
+        <p:nvSpPr>
+          <p:cNvPr id="2" name="标题 1"/>
+          <p:cNvSpPr>
+            <a:spLocks noGrp="1"/>
+          </p:cNvSpPr>
+          <p:nvPr>
+            <p:ph type="title"/>
+          </p:nvPr>
+        </p:nvSpPr>
+        <p:spPr/>
+        <p:txBody>
+          <a:bodyPr/>
+          <a:lstStyle/>
+          <a:p>
+            <a:r>
+              <a:rPr dirty="0">
                 <a:sym typeface="+mn-ea"/>
               </a:rPr>
               <a:t>主问题：如何使用</a:t>
             </a:r>
             <a:r>
-              <a:rPr lang="en-US" altLang="zh-CN">
-                <a:sym typeface="+mn-ea"/>
-              </a:rPr>
-              <a:t>WebGPU</a:t>
-            </a:r>
-            <a:r>
-              <a:rPr>
+              <a:rPr lang="zh-CN" altLang="en-US" dirty="0">
+                <a:sym typeface="+mn-ea"/>
+              </a:rPr>
+              <a:t>光栅化管线</a:t>
+            </a:r>
+            <a:r>
+              <a:rPr dirty="0">
                 <a:sym typeface="+mn-ea"/>
               </a:rPr>
               <a:t>实现</a:t>
             </a:r>
             <a:r>
-              <a:rPr lang="en-US" altLang="zh-CN">
+              <a:rPr lang="en-US" altLang="zh-CN" dirty="0">
                 <a:sym typeface="+mn-ea"/>
               </a:rPr>
               <a:t>“</a:t>
             </a:r>
             <a:r>
-              <a:rPr>
+              <a:rPr dirty="0">
                 <a:sym typeface="+mn-ea"/>
               </a:rPr>
               <a:t>绘制一个三角形</a:t>
             </a:r>
             <a:r>
-              <a:rPr lang="en-US" altLang="zh-CN">
+              <a:rPr lang="en-US" altLang="zh-CN" dirty="0">
                 <a:sym typeface="+mn-ea"/>
               </a:rPr>
               <a:t>”</a:t>
@@ -9628,7 +10108,7 @@
 </p:sld>
 </file>
 
-<file path=ppt/slides/slide23.xml><?xml version="1.0" encoding="utf-8"?>
+<file path=ppt/slides/slide25.xml><?xml version="1.0" encoding="utf-8"?>
 <p:sld xmlns:a="http://schemas.openxmlformats.org/drawingml/2006/main" xmlns:r="http://schemas.openxmlformats.org/officeDocument/2006/relationships" xmlns:p="http://schemas.openxmlformats.org/presentationml/2006/main">
   <p:cSld>
     <p:spTree>
@@ -9730,10 +10210,85 @@
   <p:clrMapOvr>
     <a:masterClrMapping/>
   </p:clrMapOvr>
+  <p:timing>
+    <p:tnLst>
+      <p:par>
+        <p:cTn id="1" dur="indefinite" restart="never" nodeType="tmRoot">
+          <p:childTnLst>
+            <p:seq concurrent="1" nextAc="seek">
+              <p:cTn id="2" dur="indefinite" nodeType="mainSeq">
+                <p:childTnLst>
+                  <p:par>
+                    <p:cTn id="3" fill="hold">
+                      <p:stCondLst>
+                        <p:cond delay="indefinite"/>
+                      </p:stCondLst>
+                      <p:childTnLst>
+                        <p:par>
+                          <p:cTn id="4" fill="hold">
+                            <p:stCondLst>
+                              <p:cond delay="0"/>
+                            </p:stCondLst>
+                            <p:childTnLst>
+                              <p:par>
+                                <p:cTn id="5" presetID="1" presetClass="entr" presetSubtype="0" fill="hold" nodeType="clickEffect">
+                                  <p:stCondLst>
+                                    <p:cond delay="0"/>
+                                  </p:stCondLst>
+                                  <p:childTnLst>
+                                    <p:set>
+                                      <p:cBhvr>
+                                        <p:cTn id="6" dur="1" fill="hold">
+                                          <p:stCondLst>
+                                            <p:cond delay="0"/>
+                                          </p:stCondLst>
+                                        </p:cTn>
+                                        <p:tgtEl>
+                                          <p:spTgt spid="5"/>
+                                        </p:tgtEl>
+                                        <p:attrNameLst>
+                                          <p:attrName>style.visibility</p:attrName>
+                                        </p:attrNameLst>
+                                      </p:cBhvr>
+                                      <p:to>
+                                        <p:strVal val="visible"/>
+                                      </p:to>
+                                    </p:set>
+                                  </p:childTnLst>
+                                </p:cTn>
+                              </p:par>
+                            </p:childTnLst>
+                          </p:cTn>
+                        </p:par>
+                      </p:childTnLst>
+                    </p:cTn>
+                  </p:par>
+                </p:childTnLst>
+              </p:cTn>
+              <p:prevCondLst>
+                <p:cond evt="onPrev" delay="0">
+                  <p:tgtEl>
+                    <p:sldTgt/>
+                  </p:tgtEl>
+                </p:cond>
+              </p:prevCondLst>
+              <p:nextCondLst>
+                <p:cond evt="onNext" delay="0">
+                  <p:tgtEl>
+                    <p:sldTgt/>
+                  </p:tgtEl>
+                </p:cond>
+              </p:nextCondLst>
+            </p:seq>
+          </p:childTnLst>
+        </p:cTn>
+      </p:par>
+    </p:tnLst>
+  </p:timing>
 </p:sld>
 </file>
 
-<file path=ppt/slides/slide24.xml><?xml version="1.0" encoding="utf-8"?>
+<file path=ppt/slides/slide26.xml><?xml version="1.0" encoding="utf-8"?>
 <p:sld xmlns:a="http://schemas.openxmlformats.org/drawingml/2006/main" xmlns:r="http://schemas.openxmlformats.org/officeDocument/2006/relationships" xmlns:p="http://schemas.openxmlformats.org/presentationml/2006/main">
   <p:cSld>
     <p:spTree>
@@ -9773,42 +10328,42 @@
           <a:lstStyle/>
           <a:p>
             <a:r>
-              <a:rPr>
+              <a:rPr dirty="0">
                 <a:sym typeface="+mn-ea"/>
               </a:rPr>
               <a:t>主问题：如何使用</a:t>
             </a:r>
             <a:r>
-              <a:rPr lang="en-US" altLang="zh-CN">
-                <a:sym typeface="+mn-ea"/>
-              </a:rPr>
-              <a:t>WebGPU</a:t>
-            </a:r>
-            <a:r>
-              <a:rPr>
+              <a:rPr lang="zh-CN" altLang="en-US" dirty="0">
+                <a:sym typeface="+mn-ea"/>
+              </a:rPr>
+              <a:t>光栅化管线</a:t>
+            </a:r>
+            <a:r>
+              <a:rPr dirty="0">
                 <a:sym typeface="+mn-ea"/>
               </a:rPr>
               <a:t>实现</a:t>
             </a:r>
             <a:r>
-              <a:rPr lang="en-US" altLang="zh-CN">
+              <a:rPr lang="en-US" altLang="zh-CN" dirty="0">
                 <a:sym typeface="+mn-ea"/>
               </a:rPr>
               <a:t>“</a:t>
             </a:r>
             <a:r>
-              <a:rPr>
+              <a:rPr dirty="0">
                 <a:sym typeface="+mn-ea"/>
               </a:rPr>
               <a:t>绘制一个三角形</a:t>
             </a:r>
             <a:r>
-              <a:rPr lang="en-US" altLang="zh-CN">
+              <a:rPr lang="en-US" altLang="zh-CN" dirty="0">
                 <a:sym typeface="+mn-ea"/>
               </a:rPr>
               <a:t>”</a:t>
             </a:r>
-            <a:endParaRPr lang="zh-CN">
+            <a:endParaRPr lang="zh-CN" dirty="0">
               <a:sym typeface="+mn-ea"/>
             </a:endParaRPr>
           </a:p>
@@ -9832,56 +10387,80 @@
           <a:lstStyle/>
           <a:p>
             <a:r>
-              <a:rPr lang="zh-CN" altLang="en-US"/>
-              <a:t>已知一个三角形的三个顶点，如何通过光栅化管线渲染出一个三角形？</a:t>
-            </a:r>
-          </a:p>
-          <a:p>
-            <a:endParaRPr lang="zh-CN" altLang="en-US"/>
-          </a:p>
-          <a:p>
-            <a:endParaRPr lang="zh-CN" altLang="en-US"/>
-          </a:p>
-          <a:p>
-            <a:endParaRPr lang="zh-CN" altLang="en-US"/>
-          </a:p>
-          <a:p>
-            <a:endParaRPr lang="zh-CN" altLang="en-US"/>
-          </a:p>
-          <a:p>
-            <a:endParaRPr lang="zh-CN" altLang="en-US"/>
-          </a:p>
-          <a:p>
-            <a:endParaRPr lang="zh-CN" altLang="en-US"/>
-          </a:p>
-          <a:p>
-            <a:endParaRPr lang="zh-CN" altLang="en-US"/>
-          </a:p>
-          <a:p>
-            <a:r>
-              <a:rPr>
+              <a:rPr lang="zh-CN" altLang="en-US" dirty="0"/>
+              <a:t>已知一个三角形的三个顶点（</a:t>
+            </a:r>
+            <a:r>
+              <a:rPr lang="en-US" altLang="zh-CN" dirty="0"/>
+              <a:t>2D</a:t>
+            </a:r>
+            <a:r>
+              <a:rPr lang="zh-CN" altLang="en-US" dirty="0"/>
+              <a:t>坐标，</a:t>
+            </a:r>
+            <a:r>
+              <a:rPr lang="en-US" altLang="zh-CN" dirty="0"/>
+              <a:t>z</a:t>
+            </a:r>
+            <a:r>
+              <a:rPr lang="zh-CN" altLang="en-US" dirty="0"/>
+              <a:t>为</a:t>
+            </a:r>
+            <a:r>
+              <a:rPr lang="en-US" altLang="zh-CN" dirty="0"/>
+              <a:t>0</a:t>
+            </a:r>
+            <a:r>
+              <a:rPr lang="zh-CN" altLang="en-US" dirty="0"/>
+              <a:t>），如何通过光栅化管线渲染出一个三角形？</a:t>
+            </a:r>
+          </a:p>
+          <a:p>
+            <a:endParaRPr lang="zh-CN" altLang="en-US" dirty="0"/>
+          </a:p>
+          <a:p>
+            <a:endParaRPr lang="zh-CN" altLang="en-US" dirty="0"/>
+          </a:p>
+          <a:p>
+            <a:endParaRPr lang="zh-CN" altLang="en-US" dirty="0"/>
+          </a:p>
+          <a:p>
+            <a:endParaRPr lang="zh-CN" altLang="en-US" dirty="0"/>
+          </a:p>
+          <a:p>
+            <a:endParaRPr lang="zh-CN" altLang="en-US" dirty="0"/>
+          </a:p>
+          <a:p>
+            <a:endParaRPr lang="zh-CN" altLang="en-US" dirty="0"/>
+          </a:p>
+          <a:p>
+            <a:endParaRPr lang="zh-CN" altLang="en-US" dirty="0"/>
+          </a:p>
+          <a:p>
+            <a:r>
+              <a:rPr dirty="0" err="1">
                 <a:sym typeface="+mn-ea"/>
               </a:rPr>
               <a:t>自学</a:t>
             </a:r>
             <a:r>
-              <a:rPr lang="zh-CN">
+              <a:rPr lang="zh-CN" dirty="0">
                 <a:sym typeface="+mn-ea"/>
               </a:rPr>
               <a:t>、互学、</a:t>
             </a:r>
             <a:r>
-              <a:rPr>
+              <a:rPr dirty="0" err="1">
                 <a:sym typeface="+mn-ea"/>
               </a:rPr>
               <a:t>展学</a:t>
             </a:r>
-            <a:endParaRPr lang="zh-CN">
+            <a:endParaRPr lang="zh-CN" dirty="0">
               <a:sym typeface="+mn-ea"/>
             </a:endParaRPr>
           </a:p>
           <a:p>
-            <a:endParaRPr lang="zh-CN" altLang="en-US"/>
+            <a:endParaRPr lang="zh-CN" altLang="en-US" dirty="0"/>
           </a:p>
         </p:txBody>
       </p:sp>
@@ -9999,381 +10578,6 @@
 </p:sld>
 </file>
 
-<file path=ppt/slides/slide25.xml><?xml version="1.0" encoding="utf-8"?>
-<p:sld xmlns:a="http://schemas.openxmlformats.org/drawingml/2006/main" xmlns:r="http://schemas.openxmlformats.org/officeDocument/2006/relationships" xmlns:p="http://schemas.openxmlformats.org/presentationml/2006/main">
-  <p:cSld>
-    <p:spTree>
-      <p:nvGrpSpPr>
-        <p:cNvPr id="1" name=""/>
-        <p:cNvGrpSpPr/>
-        <p:nvPr/>
-      </p:nvGrpSpPr>
-      <p:grpSpPr>
-        <a:xfrm>
-          <a:off x="0" y="0"/>
-          <a:ext cx="0" cy="0"/>
-          <a:chOff x="0" y="0"/>
-          <a:chExt cx="0" cy="0"/>
-        </a:xfrm>
-      </p:grpSpPr>
-      <p:sp>
-        <p:nvSpPr>
-          <p:cNvPr id="2" name="标题 1"/>
-          <p:cNvSpPr>
-            <a:spLocks noGrp="1"/>
-          </p:cNvSpPr>
-          <p:nvPr>
-            <p:ph type="title"/>
-          </p:nvPr>
-        </p:nvSpPr>
-        <p:spPr>
-          <a:xfrm>
-            <a:off x="838200" y="365125"/>
-            <a:ext cx="10515600" cy="1325563"/>
-          </a:xfrm>
-        </p:spPr>
-        <p:txBody>
-          <a:bodyPr>
-            <a:normAutofit/>
-          </a:bodyPr>
-          <a:lstStyle/>
-          <a:p>
-            <a:r>
-              <a:rPr lang="zh-CN" altLang="en-US" dirty="0">
-                <a:sym typeface="+mn-ea"/>
-              </a:rPr>
-              <a:t>任务</a:t>
-            </a:r>
-            <a:r>
-              <a:rPr dirty="0">
-                <a:sym typeface="+mn-ea"/>
-              </a:rPr>
-              <a:t>：使用</a:t>
-            </a:r>
-            <a:r>
-              <a:rPr lang="en-US" altLang="zh-CN" dirty="0" err="1">
-                <a:sym typeface="+mn-ea"/>
-              </a:rPr>
-              <a:t>WebGPU</a:t>
-            </a:r>
-            <a:r>
-              <a:rPr dirty="0">
-                <a:sym typeface="+mn-ea"/>
-              </a:rPr>
-              <a:t>实现</a:t>
-            </a:r>
-            <a:r>
-              <a:rPr lang="en-US" altLang="zh-CN" dirty="0">
-                <a:sym typeface="+mn-ea"/>
-              </a:rPr>
-              <a:t>“</a:t>
-            </a:r>
-            <a:r>
-              <a:rPr dirty="0">
-                <a:sym typeface="+mn-ea"/>
-              </a:rPr>
-              <a:t>绘制一个三角形</a:t>
-            </a:r>
-            <a:r>
-              <a:rPr lang="en-US" altLang="zh-CN" dirty="0">
-                <a:sym typeface="+mn-ea"/>
-              </a:rPr>
-              <a:t>”</a:t>
-            </a:r>
-            <a:endParaRPr lang="zh-CN" dirty="0">
-              <a:sym typeface="+mn-ea"/>
-            </a:endParaRPr>
-          </a:p>
-        </p:txBody>
-      </p:sp>
-      <p:sp>
-        <p:nvSpPr>
-          <p:cNvPr id="3" name="内容占位符 2"/>
-          <p:cNvSpPr>
-            <a:spLocks noGrp="1"/>
-          </p:cNvSpPr>
-          <p:nvPr>
-            <p:ph idx="1"/>
-          </p:nvPr>
-        </p:nvSpPr>
-        <p:spPr/>
-        <p:txBody>
-          <a:bodyPr>
-            <a:normAutofit/>
-          </a:bodyPr>
-          <a:lstStyle/>
-          <a:p>
-            <a:r>
-              <a:rPr lang="zh-CN" altLang="en-US" dirty="0"/>
-              <a:t>请实现代码</a:t>
-            </a:r>
-            <a:endParaRPr lang="en-US" altLang="zh-CN" dirty="0"/>
-          </a:p>
-          <a:p>
-            <a:r>
-              <a:rPr lang="zh-CN" altLang="en-US" dirty="0"/>
-              <a:t>请每个同学运行代码，渲染出一个三角形</a:t>
-            </a:r>
-          </a:p>
-          <a:p>
-            <a:endParaRPr lang="zh-CN" altLang="en-US" dirty="0"/>
-          </a:p>
-          <a:p>
-            <a:endParaRPr lang="zh-CN" altLang="en-US" dirty="0"/>
-          </a:p>
-        </p:txBody>
-      </p:sp>
-    </p:spTree>
-    <p:custDataLst>
-      <p:tags r:id="rId1"/>
-    </p:custDataLst>
-  </p:cSld>
-  <p:clrMapOvr>
-    <a:masterClrMapping/>
-  </p:clrMapOvr>
-</p:sld>
-</file>
-
-<file path=ppt/slides/slide26.xml><?xml version="1.0" encoding="utf-8"?>
-<p:sld xmlns:a="http://schemas.openxmlformats.org/drawingml/2006/main" xmlns:r="http://schemas.openxmlformats.org/officeDocument/2006/relationships" xmlns:p="http://schemas.openxmlformats.org/presentationml/2006/main">
-  <p:cSld>
-    <p:spTree>
-      <p:nvGrpSpPr>
-        <p:cNvPr id="1" name=""/>
-        <p:cNvGrpSpPr/>
-        <p:nvPr/>
-      </p:nvGrpSpPr>
-      <p:grpSpPr>
-        <a:xfrm>
-          <a:off x="0" y="0"/>
-          <a:ext cx="0" cy="0"/>
-          <a:chOff x="0" y="0"/>
-          <a:chExt cx="0" cy="0"/>
-        </a:xfrm>
-      </p:grpSpPr>
-      <p:sp>
-        <p:nvSpPr>
-          <p:cNvPr id="2" name="标题 1"/>
-          <p:cNvSpPr>
-            <a:spLocks noGrp="1"/>
-          </p:cNvSpPr>
-          <p:nvPr>
-            <p:ph type="title"/>
-          </p:nvPr>
-        </p:nvSpPr>
-        <p:spPr>
-          <a:xfrm>
-            <a:off x="838200" y="365125"/>
-            <a:ext cx="10515600" cy="1325563"/>
-          </a:xfrm>
-        </p:spPr>
-        <p:txBody>
-          <a:bodyPr>
-            <a:normAutofit/>
-          </a:bodyPr>
-          <a:lstStyle/>
-          <a:p>
-            <a:r>
-              <a:rPr>
-                <a:sym typeface="+mn-ea"/>
-              </a:rPr>
-              <a:t>主问题：如何使用</a:t>
-            </a:r>
-            <a:r>
-              <a:rPr lang="en-US" altLang="zh-CN">
-                <a:sym typeface="+mn-ea"/>
-              </a:rPr>
-              <a:t>WebGPU</a:t>
-            </a:r>
-            <a:r>
-              <a:rPr>
-                <a:sym typeface="+mn-ea"/>
-              </a:rPr>
-              <a:t>实现</a:t>
-            </a:r>
-            <a:r>
-              <a:rPr lang="en-US" altLang="zh-CN">
-                <a:sym typeface="+mn-ea"/>
-              </a:rPr>
-              <a:t>“</a:t>
-            </a:r>
-            <a:r>
-              <a:rPr>
-                <a:sym typeface="+mn-ea"/>
-              </a:rPr>
-              <a:t>绘制一个三角形</a:t>
-            </a:r>
-            <a:r>
-              <a:rPr lang="en-US" altLang="zh-CN">
-                <a:sym typeface="+mn-ea"/>
-              </a:rPr>
-              <a:t>”</a:t>
-            </a:r>
-            <a:endParaRPr lang="zh-CN">
-              <a:sym typeface="+mn-ea"/>
-            </a:endParaRPr>
-          </a:p>
-        </p:txBody>
-      </p:sp>
-      <p:sp>
-        <p:nvSpPr>
-          <p:cNvPr id="3" name="内容占位符 2"/>
-          <p:cNvSpPr>
-            <a:spLocks noGrp="1"/>
-          </p:cNvSpPr>
-          <p:nvPr>
-            <p:ph idx="1"/>
-          </p:nvPr>
-        </p:nvSpPr>
-        <p:spPr/>
-        <p:txBody>
-          <a:bodyPr>
-            <a:normAutofit lnSpcReduction="10000"/>
-          </a:bodyPr>
-          <a:lstStyle/>
-          <a:p>
-            <a:pPr marL="285750" indent="-285750">
-              <a:buFont typeface="Arial" panose="020B0604020202020204" pitchFamily="34" charset="0"/>
-              <a:buChar char="•"/>
-            </a:pPr>
-            <a:r>
-              <a:rPr lang="en-US" altLang="zh-CN" dirty="0" err="1">
-                <a:sym typeface="+mn-ea"/>
-              </a:rPr>
-              <a:t>WebGPU</a:t>
-            </a:r>
-            <a:r>
-              <a:rPr lang="en-US" altLang="zh-CN" dirty="0">
-                <a:sym typeface="+mn-ea"/>
-              </a:rPr>
-              <a:t> Node</a:t>
-            </a:r>
-            <a:r>
-              <a:rPr lang="zh-CN" altLang="en-US" dirty="0">
-                <a:sym typeface="+mn-ea"/>
-              </a:rPr>
-              <a:t>提供的老版本的</a:t>
-            </a:r>
-            <a:r>
-              <a:rPr lang="en-US" altLang="zh-CN" dirty="0" err="1">
-                <a:sym typeface="+mn-ea"/>
-              </a:rPr>
-              <a:t>WebGPU</a:t>
-            </a:r>
-            <a:r>
-              <a:rPr lang="en-US" altLang="zh-CN" dirty="0">
-                <a:sym typeface="+mn-ea"/>
-              </a:rPr>
-              <a:t> API</a:t>
-            </a:r>
-            <a:r>
-              <a:rPr lang="zh-CN" altLang="en-US" dirty="0">
-                <a:sym typeface="+mn-ea"/>
-              </a:rPr>
-              <a:t>和</a:t>
-            </a:r>
-            <a:r>
-              <a:rPr lang="en-US" altLang="zh-CN" dirty="0" err="1">
-                <a:sym typeface="+mn-ea"/>
-              </a:rPr>
-              <a:t>WebGPU</a:t>
-            </a:r>
-            <a:r>
-              <a:rPr lang="zh-CN" altLang="en-US" dirty="0">
-                <a:sym typeface="+mn-ea"/>
-              </a:rPr>
-              <a:t>标准相比有哪些区别？</a:t>
-            </a:r>
-          </a:p>
-          <a:p>
-            <a:pPr marL="285750" lvl="0" indent="-285750">
-              <a:buFont typeface="Arial" panose="020B0604020202020204" pitchFamily="34" charset="0"/>
-              <a:buChar char="•"/>
-            </a:pPr>
-            <a:r>
-              <a:rPr lang="zh-CN" altLang="en-US" dirty="0">
-                <a:sym typeface="+mn-ea"/>
-              </a:rPr>
-              <a:t>是否容易移植到</a:t>
-            </a:r>
-            <a:r>
-              <a:rPr lang="en-US" altLang="zh-CN" dirty="0" err="1">
-                <a:sym typeface="+mn-ea"/>
-              </a:rPr>
-              <a:t>WebGPU</a:t>
-            </a:r>
-            <a:r>
-              <a:rPr lang="zh-CN" altLang="en-US" dirty="0">
-                <a:sym typeface="+mn-ea"/>
-              </a:rPr>
-              <a:t>标准？</a:t>
-            </a:r>
-          </a:p>
-          <a:p>
-            <a:endParaRPr lang="zh-CN" altLang="en-US" dirty="0"/>
-          </a:p>
-          <a:p>
-            <a:endParaRPr lang="zh-CN" altLang="en-US" dirty="0"/>
-          </a:p>
-          <a:p>
-            <a:endParaRPr lang="zh-CN" altLang="en-US" dirty="0"/>
-          </a:p>
-          <a:p>
-            <a:endParaRPr lang="zh-CN" altLang="en-US" dirty="0"/>
-          </a:p>
-          <a:p>
-            <a:endParaRPr lang="zh-CN" altLang="en-US" dirty="0"/>
-          </a:p>
-          <a:p>
-            <a:endParaRPr lang="zh-CN" altLang="en-US" dirty="0"/>
-          </a:p>
-          <a:p>
-            <a:endParaRPr lang="zh-CN" altLang="en-US" dirty="0"/>
-          </a:p>
-          <a:p>
-            <a:r>
-              <a:rPr dirty="0" err="1">
-                <a:sym typeface="+mn-ea"/>
-              </a:rPr>
-              <a:t>自学</a:t>
-            </a:r>
-            <a:r>
-              <a:rPr lang="zh-CN" dirty="0">
-                <a:sym typeface="+mn-ea"/>
-              </a:rPr>
-              <a:t>、互学、</a:t>
-            </a:r>
-            <a:r>
-              <a:rPr dirty="0" err="1">
-                <a:sym typeface="+mn-ea"/>
-              </a:rPr>
-              <a:t>展学</a:t>
-            </a:r>
-            <a:endParaRPr lang="zh-CN" dirty="0">
-              <a:sym typeface="+mn-ea"/>
-            </a:endParaRPr>
-          </a:p>
-          <a:p>
-            <a:endParaRPr lang="zh-CN" altLang="en-US" dirty="0"/>
-          </a:p>
-        </p:txBody>
-      </p:sp>
-    </p:spTree>
-    <p:custDataLst>
-      <p:tags r:id="rId1"/>
-    </p:custDataLst>
-    <p:extLst>
-      <p:ext uri="{BB962C8B-B14F-4D97-AF65-F5344CB8AC3E}">
-        <p14:creationId xmlns:p14="http://schemas.microsoft.com/office/powerpoint/2010/main" val="1514914667"/>
-      </p:ext>
-    </p:extLst>
-  </p:cSld>
-  <p:clrMapOvr>
-    <a:masterClrMapping/>
-  </p:clrMapOvr>
-</p:sld>
-</file>
-
 <file path=ppt/slides/slide27.xml><?xml version="1.0" encoding="utf-8"?>
 <p:sld xmlns:a="http://schemas.openxmlformats.org/drawingml/2006/main" xmlns:r="http://schemas.openxmlformats.org/officeDocument/2006/relationships" xmlns:p="http://schemas.openxmlformats.org/presentationml/2006/main">
   <p:cSld>
@@ -10411,7 +10615,7 @@
               <a:buChar char="•"/>
             </a:pPr>
             <a:r>
-              <a:rPr>
+              <a:rPr dirty="0">
                 <a:sym typeface="+mn-ea"/>
               </a:rPr>
               <a:t>如何通过光栅化管线渲染出一个三角形？</a:t>
@@ -10422,11 +10626,11 @@
               <a:buFont typeface="Arial" panose="020B0604020202020204" pitchFamily="34" charset="0"/>
             </a:pPr>
             <a:br>
-              <a:rPr>
+              <a:rPr dirty="0">
                 <a:sym typeface="+mn-ea"/>
               </a:rPr>
             </a:br>
-            <a:endParaRPr>
+            <a:endParaRPr dirty="0">
               <a:sym typeface="+mn-ea"/>
             </a:endParaRPr>
           </a:p>
@@ -10500,7 +10704,7 @@
                                         <p:tgtEl>
                                           <p:spTgt spid="2">
                                             <p:txEl>
-                                              <p:pRg st="1" end="1"/>
+                                              <p:pRg st="0" end="0"/>
                                             </p:txEl>
                                           </p:spTgt>
                                         </p:tgtEl>
@@ -10579,6 +10783,1169 @@
           <a:lstStyle/>
           <a:p>
             <a:r>
+              <a:rPr lang="zh-CN" altLang="en-US" dirty="0">
+                <a:sym typeface="+mn-ea"/>
+              </a:rPr>
+              <a:t>任务：使用光栅化管线实现“绘制一个三角形”</a:t>
+            </a:r>
+            <a:endParaRPr dirty="0">
+              <a:sym typeface="+mn-ea"/>
+            </a:endParaRPr>
+          </a:p>
+        </p:txBody>
+      </p:sp>
+    </p:spTree>
+    <p:custDataLst>
+      <p:tags r:id="rId1"/>
+    </p:custDataLst>
+    <p:extLst>
+      <p:ext uri="{BB962C8B-B14F-4D97-AF65-F5344CB8AC3E}">
+        <p14:creationId xmlns:p14="http://schemas.microsoft.com/office/powerpoint/2010/main" val="1775184304"/>
+      </p:ext>
+    </p:extLst>
+  </p:cSld>
+  <p:clrMapOvr>
+    <a:masterClrMapping/>
+  </p:clrMapOvr>
+</p:sld>
+</file>
+
+<file path=ppt/slides/slide29.xml><?xml version="1.0" encoding="utf-8"?>
+<p:sld xmlns:a="http://schemas.openxmlformats.org/drawingml/2006/main" xmlns:r="http://schemas.openxmlformats.org/officeDocument/2006/relationships" xmlns:p="http://schemas.openxmlformats.org/presentationml/2006/main">
+  <p:cSld>
+    <p:spTree>
+      <p:nvGrpSpPr>
+        <p:cNvPr id="1" name=""/>
+        <p:cNvGrpSpPr/>
+        <p:nvPr/>
+      </p:nvGrpSpPr>
+      <p:grpSpPr>
+        <a:xfrm>
+          <a:off x="0" y="0"/>
+          <a:ext cx="0" cy="0"/>
+          <a:chOff x="0" y="0"/>
+          <a:chExt cx="0" cy="0"/>
+        </a:xfrm>
+      </p:grpSpPr>
+      <p:sp>
+        <p:nvSpPr>
+          <p:cNvPr id="2" name="标题 1"/>
+          <p:cNvSpPr>
+            <a:spLocks noGrp="1"/>
+          </p:cNvSpPr>
+          <p:nvPr>
+            <p:ph type="title"/>
+          </p:nvPr>
+        </p:nvSpPr>
+        <p:spPr>
+          <a:xfrm>
+            <a:off x="838200" y="365125"/>
+            <a:ext cx="10515600" cy="1325563"/>
+          </a:xfrm>
+        </p:spPr>
+        <p:txBody>
+          <a:bodyPr>
+            <a:normAutofit/>
+          </a:bodyPr>
+          <a:lstStyle/>
+          <a:p>
+            <a:r>
+              <a:rPr lang="zh-CN" altLang="en-US" dirty="0">
+                <a:sym typeface="+mn-ea"/>
+              </a:rPr>
+              <a:t>任务</a:t>
+            </a:r>
+            <a:r>
+              <a:rPr dirty="0">
+                <a:sym typeface="+mn-ea"/>
+              </a:rPr>
+              <a:t>：使用</a:t>
+            </a:r>
+            <a:r>
+              <a:rPr lang="zh-CN" altLang="en-US" dirty="0">
+                <a:sym typeface="+mn-ea"/>
+              </a:rPr>
+              <a:t>光栅化管线</a:t>
+            </a:r>
+            <a:r>
+              <a:rPr dirty="0">
+                <a:sym typeface="+mn-ea"/>
+              </a:rPr>
+              <a:t>实现</a:t>
+            </a:r>
+            <a:r>
+              <a:rPr lang="en-US" altLang="zh-CN" dirty="0">
+                <a:sym typeface="+mn-ea"/>
+              </a:rPr>
+              <a:t>“</a:t>
+            </a:r>
+            <a:r>
+              <a:rPr dirty="0">
+                <a:sym typeface="+mn-ea"/>
+              </a:rPr>
+              <a:t>绘制一个三角形</a:t>
+            </a:r>
+            <a:r>
+              <a:rPr lang="en-US" altLang="zh-CN" dirty="0">
+                <a:sym typeface="+mn-ea"/>
+              </a:rPr>
+              <a:t>”</a:t>
+            </a:r>
+            <a:endParaRPr lang="zh-CN" dirty="0">
+              <a:sym typeface="+mn-ea"/>
+            </a:endParaRPr>
+          </a:p>
+        </p:txBody>
+      </p:sp>
+      <p:sp>
+        <p:nvSpPr>
+          <p:cNvPr id="3" name="内容占位符 2"/>
+          <p:cNvSpPr>
+            <a:spLocks noGrp="1"/>
+          </p:cNvSpPr>
+          <p:nvPr>
+            <p:ph idx="1"/>
+          </p:nvPr>
+        </p:nvSpPr>
+        <p:spPr/>
+        <p:txBody>
+          <a:bodyPr>
+            <a:normAutofit/>
+          </a:bodyPr>
+          <a:lstStyle/>
+          <a:p>
+            <a:r>
+              <a:rPr lang="zh-CN" altLang="en-US" dirty="0"/>
+              <a:t>请实现代码</a:t>
+            </a:r>
+            <a:endParaRPr lang="en-US" altLang="zh-CN" dirty="0"/>
+          </a:p>
+          <a:p>
+            <a:r>
+              <a:rPr lang="zh-CN" altLang="en-US" dirty="0"/>
+              <a:t>请每个同学运行代码，渲染出一个三角形</a:t>
+            </a:r>
+            <a:endParaRPr lang="en-US" altLang="zh-CN" dirty="0"/>
+          </a:p>
+          <a:p>
+            <a:r>
+              <a:rPr lang="zh-CN" altLang="en-US" dirty="0">
+                <a:sym typeface="+mn-ea"/>
+              </a:rPr>
+              <a:t>移植该程序到</a:t>
+            </a:r>
+            <a:r>
+              <a:rPr lang="en-US" altLang="zh-CN" dirty="0" err="1">
+                <a:sym typeface="+mn-ea"/>
+              </a:rPr>
+              <a:t>WebGPU</a:t>
+            </a:r>
+            <a:r>
+              <a:rPr lang="zh-CN" altLang="en-US" dirty="0">
+                <a:sym typeface="+mn-ea"/>
+              </a:rPr>
+              <a:t>标准需要哪些修改？</a:t>
+            </a:r>
+            <a:endParaRPr lang="zh-CN" altLang="en-US" dirty="0"/>
+          </a:p>
+          <a:p>
+            <a:endParaRPr lang="zh-CN" altLang="en-US" dirty="0"/>
+          </a:p>
+          <a:p>
+            <a:endParaRPr lang="zh-CN" altLang="en-US" dirty="0"/>
+          </a:p>
+        </p:txBody>
+      </p:sp>
+      <p:pic>
+        <p:nvPicPr>
+          <p:cNvPr id="4" name="图片 3" descr="视频封面">
+            <a:extLst>
+              <a:ext uri="{FF2B5EF4-FFF2-40B4-BE49-F238E27FC236}">
+                <a16:creationId xmlns:a16="http://schemas.microsoft.com/office/drawing/2014/main" id="{33592842-5C92-4E98-E112-47DAAFCD3080}"/>
+              </a:ext>
+            </a:extLst>
+          </p:cNvPr>
+          <p:cNvPicPr>
+            <a:picLocks noChangeAspect="1"/>
+          </p:cNvPicPr>
+          <p:nvPr/>
+        </p:nvPicPr>
+        <p:blipFill>
+          <a:blip r:embed="rId3"/>
+          <a:stretch>
+            <a:fillRect/>
+          </a:stretch>
+        </p:blipFill>
+        <p:spPr>
+          <a:xfrm>
+            <a:off x="6400165" y="2325211"/>
+            <a:ext cx="4173855" cy="3352165"/>
+          </a:xfrm>
+          <a:prstGeom prst="rect">
+            <a:avLst/>
+          </a:prstGeom>
+        </p:spPr>
+      </p:pic>
+    </p:spTree>
+    <p:custDataLst>
+      <p:tags r:id="rId1"/>
+    </p:custDataLst>
+  </p:cSld>
+  <p:clrMapOvr>
+    <a:masterClrMapping/>
+  </p:clrMapOvr>
+  <p:timing>
+    <p:tnLst>
+      <p:par>
+        <p:cTn id="1" dur="indefinite" restart="never" nodeType="tmRoot">
+          <p:childTnLst>
+            <p:seq concurrent="1" nextAc="seek">
+              <p:cTn id="2" dur="indefinite" nodeType="mainSeq">
+                <p:childTnLst>
+                  <p:par>
+                    <p:cTn id="3" fill="hold">
+                      <p:stCondLst>
+                        <p:cond delay="indefinite"/>
+                      </p:stCondLst>
+                      <p:childTnLst>
+                        <p:par>
+                          <p:cTn id="4" fill="hold">
+                            <p:stCondLst>
+                              <p:cond delay="0"/>
+                            </p:stCondLst>
+                            <p:childTnLst>
+                              <p:par>
+                                <p:cTn id="5" presetID="1" presetClass="entr" presetSubtype="0" fill="hold" nodeType="clickEffect">
+                                  <p:stCondLst>
+                                    <p:cond delay="0"/>
+                                  </p:stCondLst>
+                                  <p:childTnLst>
+                                    <p:set>
+                                      <p:cBhvr>
+                                        <p:cTn id="6" dur="1" fill="hold">
+                                          <p:stCondLst>
+                                            <p:cond delay="0"/>
+                                          </p:stCondLst>
+                                        </p:cTn>
+                                        <p:tgtEl>
+                                          <p:spTgt spid="3">
+                                            <p:txEl>
+                                              <p:pRg st="0" end="0"/>
+                                            </p:txEl>
+                                          </p:spTgt>
+                                        </p:tgtEl>
+                                        <p:attrNameLst>
+                                          <p:attrName>style.visibility</p:attrName>
+                                        </p:attrNameLst>
+                                      </p:cBhvr>
+                                      <p:to>
+                                        <p:strVal val="visible"/>
+                                      </p:to>
+                                    </p:set>
+                                  </p:childTnLst>
+                                </p:cTn>
+                              </p:par>
+                            </p:childTnLst>
+                          </p:cTn>
+                        </p:par>
+                      </p:childTnLst>
+                    </p:cTn>
+                  </p:par>
+                  <p:par>
+                    <p:cTn id="7" fill="hold">
+                      <p:stCondLst>
+                        <p:cond delay="indefinite"/>
+                      </p:stCondLst>
+                      <p:childTnLst>
+                        <p:par>
+                          <p:cTn id="8" fill="hold">
+                            <p:stCondLst>
+                              <p:cond delay="0"/>
+                            </p:stCondLst>
+                            <p:childTnLst>
+                              <p:par>
+                                <p:cTn id="9" presetID="1" presetClass="entr" presetSubtype="0" fill="hold" nodeType="clickEffect">
+                                  <p:stCondLst>
+                                    <p:cond delay="0"/>
+                                  </p:stCondLst>
+                                  <p:childTnLst>
+                                    <p:set>
+                                      <p:cBhvr>
+                                        <p:cTn id="10" dur="1" fill="hold">
+                                          <p:stCondLst>
+                                            <p:cond delay="0"/>
+                                          </p:stCondLst>
+                                        </p:cTn>
+                                        <p:tgtEl>
+                                          <p:spTgt spid="3">
+                                            <p:txEl>
+                                              <p:pRg st="1" end="1"/>
+                                            </p:txEl>
+                                          </p:spTgt>
+                                        </p:tgtEl>
+                                        <p:attrNameLst>
+                                          <p:attrName>style.visibility</p:attrName>
+                                        </p:attrNameLst>
+                                      </p:cBhvr>
+                                      <p:to>
+                                        <p:strVal val="visible"/>
+                                      </p:to>
+                                    </p:set>
+                                  </p:childTnLst>
+                                </p:cTn>
+                              </p:par>
+                            </p:childTnLst>
+                          </p:cTn>
+                        </p:par>
+                      </p:childTnLst>
+                    </p:cTn>
+                  </p:par>
+                  <p:par>
+                    <p:cTn id="11" fill="hold">
+                      <p:stCondLst>
+                        <p:cond delay="indefinite"/>
+                      </p:stCondLst>
+                      <p:childTnLst>
+                        <p:par>
+                          <p:cTn id="12" fill="hold">
+                            <p:stCondLst>
+                              <p:cond delay="0"/>
+                            </p:stCondLst>
+                            <p:childTnLst>
+                              <p:par>
+                                <p:cTn id="13" presetID="1" presetClass="entr" presetSubtype="0" fill="hold" nodeType="clickEffect">
+                                  <p:stCondLst>
+                                    <p:cond delay="0"/>
+                                  </p:stCondLst>
+                                  <p:childTnLst>
+                                    <p:set>
+                                      <p:cBhvr>
+                                        <p:cTn id="14" dur="1" fill="hold">
+                                          <p:stCondLst>
+                                            <p:cond delay="0"/>
+                                          </p:stCondLst>
+                                        </p:cTn>
+                                        <p:tgtEl>
+                                          <p:spTgt spid="4"/>
+                                        </p:tgtEl>
+                                        <p:attrNameLst>
+                                          <p:attrName>style.visibility</p:attrName>
+                                        </p:attrNameLst>
+                                      </p:cBhvr>
+                                      <p:to>
+                                        <p:strVal val="visible"/>
+                                      </p:to>
+                                    </p:set>
+                                  </p:childTnLst>
+                                </p:cTn>
+                              </p:par>
+                            </p:childTnLst>
+                          </p:cTn>
+                        </p:par>
+                      </p:childTnLst>
+                    </p:cTn>
+                  </p:par>
+                  <p:par>
+                    <p:cTn id="15" fill="hold">
+                      <p:stCondLst>
+                        <p:cond delay="indefinite"/>
+                      </p:stCondLst>
+                      <p:childTnLst>
+                        <p:par>
+                          <p:cTn id="16" fill="hold">
+                            <p:stCondLst>
+                              <p:cond delay="0"/>
+                            </p:stCondLst>
+                            <p:childTnLst>
+                              <p:par>
+                                <p:cTn id="17" presetID="1" presetClass="entr" presetSubtype="0" fill="hold" nodeType="clickEffect">
+                                  <p:stCondLst>
+                                    <p:cond delay="0"/>
+                                  </p:stCondLst>
+                                  <p:childTnLst>
+                                    <p:set>
+                                      <p:cBhvr>
+                                        <p:cTn id="18" dur="1" fill="hold">
+                                          <p:stCondLst>
+                                            <p:cond delay="0"/>
+                                          </p:stCondLst>
+                                        </p:cTn>
+                                        <p:tgtEl>
+                                          <p:spTgt spid="3">
+                                            <p:txEl>
+                                              <p:pRg st="2" end="2"/>
+                                            </p:txEl>
+                                          </p:spTgt>
+                                        </p:tgtEl>
+                                        <p:attrNameLst>
+                                          <p:attrName>style.visibility</p:attrName>
+                                        </p:attrNameLst>
+                                      </p:cBhvr>
+                                      <p:to>
+                                        <p:strVal val="visible"/>
+                                      </p:to>
+                                    </p:set>
+                                  </p:childTnLst>
+                                </p:cTn>
+                              </p:par>
+                            </p:childTnLst>
+                          </p:cTn>
+                        </p:par>
+                      </p:childTnLst>
+                    </p:cTn>
+                  </p:par>
+                </p:childTnLst>
+              </p:cTn>
+              <p:prevCondLst>
+                <p:cond evt="onPrev" delay="0">
+                  <p:tgtEl>
+                    <p:sldTgt/>
+                  </p:tgtEl>
+                </p:cond>
+              </p:prevCondLst>
+              <p:nextCondLst>
+                <p:cond evt="onNext" delay="0">
+                  <p:tgtEl>
+                    <p:sldTgt/>
+                  </p:tgtEl>
+                </p:cond>
+              </p:nextCondLst>
+            </p:seq>
+          </p:childTnLst>
+        </p:cTn>
+      </p:par>
+    </p:tnLst>
+  </p:timing>
+</p:sld>
+</file>
+
+<file path=ppt/slides/slide3.xml><?xml version="1.0" encoding="utf-8"?>
+<p:sld xmlns:a="http://schemas.openxmlformats.org/drawingml/2006/main" xmlns:r="http://schemas.openxmlformats.org/officeDocument/2006/relationships" xmlns:p="http://schemas.openxmlformats.org/presentationml/2006/main">
+  <p:cSld>
+    <p:spTree>
+      <p:nvGrpSpPr>
+        <p:cNvPr id="1" name=""/>
+        <p:cNvGrpSpPr/>
+        <p:nvPr/>
+      </p:nvGrpSpPr>
+      <p:grpSpPr>
+        <a:xfrm>
+          <a:off x="0" y="0"/>
+          <a:ext cx="0" cy="0"/>
+          <a:chOff x="0" y="0"/>
+          <a:chExt cx="0" cy="0"/>
+        </a:xfrm>
+      </p:grpSpPr>
+      <p:sp>
+        <p:nvSpPr>
+          <p:cNvPr id="2" name="文本占位符 1"/>
+          <p:cNvSpPr>
+            <a:spLocks noGrp="1"/>
+          </p:cNvSpPr>
+          <p:nvPr>
+            <p:ph type="body" idx="1"/>
+          </p:nvPr>
+        </p:nvSpPr>
+        <p:spPr/>
+        <p:txBody>
+          <a:bodyPr/>
+          <a:lstStyle/>
+          <a:p>
+            <a:pPr marL="285750" indent="-285750">
+              <a:buFont typeface="Arial" panose="020B0604020202020204" pitchFamily="34" charset="0"/>
+              <a:buChar char="•"/>
+            </a:pPr>
+            <a:r>
+              <a:rPr lang="zh-CN" altLang="en-US" dirty="0"/>
+              <a:t>回顾相关课程内容</a:t>
+            </a:r>
+            <a:endParaRPr lang="en-US" dirty="0">
+              <a:sym typeface="+mn-ea"/>
+            </a:endParaRPr>
+          </a:p>
+          <a:p>
+            <a:pPr marL="285750" indent="-285750">
+              <a:buFont typeface="Arial" panose="020B0604020202020204" pitchFamily="34" charset="0"/>
+              <a:buChar char="•"/>
+            </a:pPr>
+            <a:r>
+              <a:rPr dirty="0">
+                <a:sym typeface="+mn-ea"/>
+              </a:rPr>
+              <a:t>为什么要学习本课</a:t>
+            </a:r>
+            <a:endParaRPr lang="zh-CN" altLang="en-US" dirty="0"/>
+          </a:p>
+          <a:p>
+            <a:pPr marL="285750" indent="-285750">
+              <a:buFont typeface="Arial" panose="020B0604020202020204" pitchFamily="34" charset="0"/>
+              <a:buChar char="•"/>
+            </a:pPr>
+            <a:r>
+              <a:rPr dirty="0">
+                <a:sym typeface="+mn-ea"/>
+              </a:rPr>
+              <a:t>主问题：</a:t>
+            </a:r>
+            <a:r>
+              <a:rPr lang="en-US" dirty="0" err="1">
+                <a:sym typeface="+mn-ea"/>
+              </a:rPr>
+              <a:t>WebGPU</a:t>
+            </a:r>
+            <a:r>
+              <a:rPr dirty="0">
+                <a:sym typeface="+mn-ea"/>
+              </a:rPr>
+              <a:t>是什么</a:t>
+            </a:r>
+          </a:p>
+          <a:p>
+            <a:pPr marL="285750" indent="-285750">
+              <a:buFont typeface="Arial" panose="020B0604020202020204" pitchFamily="34" charset="0"/>
+              <a:buChar char="•"/>
+            </a:pPr>
+            <a:r>
+              <a:rPr dirty="0">
+                <a:sym typeface="+mn-ea"/>
+              </a:rPr>
+              <a:t>主问题：如何渲染</a:t>
+            </a:r>
+          </a:p>
+          <a:p>
+            <a:pPr marL="285750" indent="-285750">
+              <a:buFont typeface="Arial" panose="020B0604020202020204" pitchFamily="34" charset="0"/>
+              <a:buChar char="•"/>
+            </a:pPr>
+            <a:r>
+              <a:rPr dirty="0">
+                <a:sym typeface="+mn-ea"/>
+              </a:rPr>
+              <a:t>主问题：</a:t>
+            </a:r>
+            <a:r>
+              <a:rPr lang="en-US" dirty="0" err="1">
+                <a:sym typeface="+mn-ea"/>
+              </a:rPr>
+              <a:t>WebGPU</a:t>
+            </a:r>
+            <a:r>
+              <a:rPr dirty="0">
+                <a:sym typeface="+mn-ea"/>
+              </a:rPr>
+              <a:t>和</a:t>
+            </a:r>
+            <a:r>
+              <a:rPr lang="en-US" altLang="zh-CN" dirty="0">
+                <a:sym typeface="+mn-ea"/>
+              </a:rPr>
+              <a:t>WebGL</a:t>
+            </a:r>
+            <a:r>
+              <a:rPr dirty="0">
+                <a:sym typeface="+mn-ea"/>
+              </a:rPr>
+              <a:t>是什么关系</a:t>
+            </a:r>
+          </a:p>
+          <a:p>
+            <a:pPr marL="285750" indent="-285750">
+              <a:buFont typeface="Arial" panose="020B0604020202020204" pitchFamily="34" charset="0"/>
+              <a:buChar char="•"/>
+            </a:pPr>
+            <a:r>
+              <a:rPr dirty="0">
+                <a:sym typeface="+mn-ea"/>
+              </a:rPr>
+              <a:t>主问题：如何学习</a:t>
+            </a:r>
+            <a:r>
+              <a:rPr lang="en-US" dirty="0" err="1">
+                <a:sym typeface="+mn-ea"/>
+              </a:rPr>
+              <a:t>WebGPU</a:t>
+            </a:r>
+            <a:endParaRPr dirty="0">
+              <a:sym typeface="+mn-ea"/>
+            </a:endParaRPr>
+          </a:p>
+          <a:p>
+            <a:pPr marL="285750" indent="-285750">
+              <a:buFont typeface="Arial" panose="020B0604020202020204" pitchFamily="34" charset="0"/>
+              <a:buChar char="•"/>
+            </a:pPr>
+            <a:r>
+              <a:rPr lang="zh-CN" altLang="en-US" dirty="0"/>
+              <a:t>任务</a:t>
+            </a:r>
+            <a:r>
+              <a:rPr dirty="0">
+                <a:sym typeface="+mn-ea"/>
+              </a:rPr>
+              <a:t>：准备开发环境</a:t>
+            </a:r>
+          </a:p>
+          <a:p>
+            <a:pPr marL="285750" indent="-285750">
+              <a:buFont typeface="Arial" panose="020B0604020202020204" pitchFamily="34" charset="0"/>
+              <a:buChar char="•"/>
+            </a:pPr>
+            <a:r>
+              <a:rPr lang="zh-CN" altLang="en-US" dirty="0"/>
+              <a:t>主问题：如何使用光栅化管线实现“绘制一个三角形”</a:t>
+            </a:r>
+            <a:endParaRPr lang="en-US" altLang="zh-CN" dirty="0"/>
+          </a:p>
+          <a:p>
+            <a:pPr marL="285750" indent="-285750">
+              <a:buFont typeface="Arial" panose="020B0604020202020204" pitchFamily="34" charset="0"/>
+              <a:buChar char="•"/>
+            </a:pPr>
+            <a:r>
+              <a:rPr lang="zh-CN" altLang="en-US" dirty="0"/>
+              <a:t>任务：使用光栅化管线实现“绘制一个三角形”</a:t>
+            </a:r>
+            <a:endParaRPr lang="en-US" altLang="zh-CN" dirty="0"/>
+          </a:p>
+        </p:txBody>
+      </p:sp>
+      <p:sp>
+        <p:nvSpPr>
+          <p:cNvPr id="3" name="标题 2"/>
+          <p:cNvSpPr>
+            <a:spLocks noGrp="1"/>
+          </p:cNvSpPr>
+          <p:nvPr>
+            <p:ph type="title"/>
+          </p:nvPr>
+        </p:nvSpPr>
+        <p:spPr/>
+        <p:txBody>
+          <a:bodyPr/>
+          <a:lstStyle/>
+          <a:p>
+            <a:r>
+              <a:rPr lang="zh-CN" altLang="en-US"/>
+              <a:t>内容预览</a:t>
+            </a:r>
+          </a:p>
+        </p:txBody>
+      </p:sp>
+    </p:spTree>
+    <p:custDataLst>
+      <p:tags r:id="rId1"/>
+    </p:custDataLst>
+  </p:cSld>
+  <p:clrMapOvr>
+    <a:masterClrMapping/>
+  </p:clrMapOvr>
+  <p:timing>
+    <p:tnLst>
+      <p:par>
+        <p:cTn id="1" dur="indefinite" restart="never" nodeType="tmRoot">
+          <p:childTnLst>
+            <p:seq concurrent="1" nextAc="seek">
+              <p:cTn id="2" dur="indefinite" nodeType="mainSeq">
+                <p:childTnLst>
+                  <p:par>
+                    <p:cTn id="3" fill="hold">
+                      <p:stCondLst>
+                        <p:cond delay="indefinite"/>
+                      </p:stCondLst>
+                      <p:childTnLst>
+                        <p:par>
+                          <p:cTn id="4" fill="hold">
+                            <p:stCondLst>
+                              <p:cond delay="0"/>
+                            </p:stCondLst>
+                            <p:childTnLst>
+                              <p:par>
+                                <p:cTn id="5" presetID="1" presetClass="entr" presetSubtype="0" fill="hold" nodeType="clickEffect">
+                                  <p:stCondLst>
+                                    <p:cond delay="0"/>
+                                  </p:stCondLst>
+                                  <p:childTnLst>
+                                    <p:set>
+                                      <p:cBhvr>
+                                        <p:cTn id="6" dur="1" fill="hold">
+                                          <p:stCondLst>
+                                            <p:cond delay="0"/>
+                                          </p:stCondLst>
+                                        </p:cTn>
+                                        <p:tgtEl>
+                                          <p:spTgt spid="2">
+                                            <p:txEl>
+                                              <p:pRg st="0" end="0"/>
+                                            </p:txEl>
+                                          </p:spTgt>
+                                        </p:tgtEl>
+                                        <p:attrNameLst>
+                                          <p:attrName>style.visibility</p:attrName>
+                                        </p:attrNameLst>
+                                      </p:cBhvr>
+                                      <p:to>
+                                        <p:strVal val="visible"/>
+                                      </p:to>
+                                    </p:set>
+                                  </p:childTnLst>
+                                </p:cTn>
+                              </p:par>
+                            </p:childTnLst>
+                          </p:cTn>
+                        </p:par>
+                      </p:childTnLst>
+                    </p:cTn>
+                  </p:par>
+                  <p:par>
+                    <p:cTn id="7" fill="hold">
+                      <p:stCondLst>
+                        <p:cond delay="indefinite"/>
+                      </p:stCondLst>
+                      <p:childTnLst>
+                        <p:par>
+                          <p:cTn id="8" fill="hold">
+                            <p:stCondLst>
+                              <p:cond delay="0"/>
+                            </p:stCondLst>
+                            <p:childTnLst>
+                              <p:par>
+                                <p:cTn id="9" presetID="1" presetClass="entr" presetSubtype="0" fill="hold" nodeType="clickEffect">
+                                  <p:stCondLst>
+                                    <p:cond delay="0"/>
+                                  </p:stCondLst>
+                                  <p:childTnLst>
+                                    <p:set>
+                                      <p:cBhvr>
+                                        <p:cTn id="10" dur="1" fill="hold">
+                                          <p:stCondLst>
+                                            <p:cond delay="0"/>
+                                          </p:stCondLst>
+                                        </p:cTn>
+                                        <p:tgtEl>
+                                          <p:spTgt spid="2">
+                                            <p:txEl>
+                                              <p:pRg st="1" end="1"/>
+                                            </p:txEl>
+                                          </p:spTgt>
+                                        </p:tgtEl>
+                                        <p:attrNameLst>
+                                          <p:attrName>style.visibility</p:attrName>
+                                        </p:attrNameLst>
+                                      </p:cBhvr>
+                                      <p:to>
+                                        <p:strVal val="visible"/>
+                                      </p:to>
+                                    </p:set>
+                                  </p:childTnLst>
+                                </p:cTn>
+                              </p:par>
+                            </p:childTnLst>
+                          </p:cTn>
+                        </p:par>
+                      </p:childTnLst>
+                    </p:cTn>
+                  </p:par>
+                  <p:par>
+                    <p:cTn id="11" fill="hold">
+                      <p:stCondLst>
+                        <p:cond delay="indefinite"/>
+                      </p:stCondLst>
+                      <p:childTnLst>
+                        <p:par>
+                          <p:cTn id="12" fill="hold">
+                            <p:stCondLst>
+                              <p:cond delay="0"/>
+                            </p:stCondLst>
+                            <p:childTnLst>
+                              <p:par>
+                                <p:cTn id="13" presetID="1" presetClass="entr" presetSubtype="0" fill="hold" nodeType="clickEffect">
+                                  <p:stCondLst>
+                                    <p:cond delay="0"/>
+                                  </p:stCondLst>
+                                  <p:childTnLst>
+                                    <p:set>
+                                      <p:cBhvr>
+                                        <p:cTn id="14" dur="1" fill="hold">
+                                          <p:stCondLst>
+                                            <p:cond delay="0"/>
+                                          </p:stCondLst>
+                                        </p:cTn>
+                                        <p:tgtEl>
+                                          <p:spTgt spid="2">
+                                            <p:txEl>
+                                              <p:pRg st="2" end="2"/>
+                                            </p:txEl>
+                                          </p:spTgt>
+                                        </p:tgtEl>
+                                        <p:attrNameLst>
+                                          <p:attrName>style.visibility</p:attrName>
+                                        </p:attrNameLst>
+                                      </p:cBhvr>
+                                      <p:to>
+                                        <p:strVal val="visible"/>
+                                      </p:to>
+                                    </p:set>
+                                  </p:childTnLst>
+                                </p:cTn>
+                              </p:par>
+                            </p:childTnLst>
+                          </p:cTn>
+                        </p:par>
+                      </p:childTnLst>
+                    </p:cTn>
+                  </p:par>
+                  <p:par>
+                    <p:cTn id="15" fill="hold">
+                      <p:stCondLst>
+                        <p:cond delay="indefinite"/>
+                      </p:stCondLst>
+                      <p:childTnLst>
+                        <p:par>
+                          <p:cTn id="16" fill="hold">
+                            <p:stCondLst>
+                              <p:cond delay="0"/>
+                            </p:stCondLst>
+                            <p:childTnLst>
+                              <p:par>
+                                <p:cTn id="17" presetID="1" presetClass="entr" presetSubtype="0" fill="hold" nodeType="clickEffect">
+                                  <p:stCondLst>
+                                    <p:cond delay="0"/>
+                                  </p:stCondLst>
+                                  <p:childTnLst>
+                                    <p:set>
+                                      <p:cBhvr>
+                                        <p:cTn id="18" dur="1" fill="hold">
+                                          <p:stCondLst>
+                                            <p:cond delay="0"/>
+                                          </p:stCondLst>
+                                        </p:cTn>
+                                        <p:tgtEl>
+                                          <p:spTgt spid="2">
+                                            <p:txEl>
+                                              <p:pRg st="3" end="3"/>
+                                            </p:txEl>
+                                          </p:spTgt>
+                                        </p:tgtEl>
+                                        <p:attrNameLst>
+                                          <p:attrName>style.visibility</p:attrName>
+                                        </p:attrNameLst>
+                                      </p:cBhvr>
+                                      <p:to>
+                                        <p:strVal val="visible"/>
+                                      </p:to>
+                                    </p:set>
+                                  </p:childTnLst>
+                                </p:cTn>
+                              </p:par>
+                            </p:childTnLst>
+                          </p:cTn>
+                        </p:par>
+                      </p:childTnLst>
+                    </p:cTn>
+                  </p:par>
+                  <p:par>
+                    <p:cTn id="19" fill="hold">
+                      <p:stCondLst>
+                        <p:cond delay="indefinite"/>
+                      </p:stCondLst>
+                      <p:childTnLst>
+                        <p:par>
+                          <p:cTn id="20" fill="hold">
+                            <p:stCondLst>
+                              <p:cond delay="0"/>
+                            </p:stCondLst>
+                            <p:childTnLst>
+                              <p:par>
+                                <p:cTn id="21" presetID="1" presetClass="entr" presetSubtype="0" fill="hold" nodeType="clickEffect">
+                                  <p:stCondLst>
+                                    <p:cond delay="0"/>
+                                  </p:stCondLst>
+                                  <p:childTnLst>
+                                    <p:set>
+                                      <p:cBhvr>
+                                        <p:cTn id="22" dur="1" fill="hold">
+                                          <p:stCondLst>
+                                            <p:cond delay="0"/>
+                                          </p:stCondLst>
+                                        </p:cTn>
+                                        <p:tgtEl>
+                                          <p:spTgt spid="2">
+                                            <p:txEl>
+                                              <p:pRg st="4" end="4"/>
+                                            </p:txEl>
+                                          </p:spTgt>
+                                        </p:tgtEl>
+                                        <p:attrNameLst>
+                                          <p:attrName>style.visibility</p:attrName>
+                                        </p:attrNameLst>
+                                      </p:cBhvr>
+                                      <p:to>
+                                        <p:strVal val="visible"/>
+                                      </p:to>
+                                    </p:set>
+                                  </p:childTnLst>
+                                </p:cTn>
+                              </p:par>
+                            </p:childTnLst>
+                          </p:cTn>
+                        </p:par>
+                      </p:childTnLst>
+                    </p:cTn>
+                  </p:par>
+                  <p:par>
+                    <p:cTn id="23" fill="hold">
+                      <p:stCondLst>
+                        <p:cond delay="indefinite"/>
+                      </p:stCondLst>
+                      <p:childTnLst>
+                        <p:par>
+                          <p:cTn id="24" fill="hold">
+                            <p:stCondLst>
+                              <p:cond delay="0"/>
+                            </p:stCondLst>
+                            <p:childTnLst>
+                              <p:par>
+                                <p:cTn id="25" presetID="1" presetClass="entr" presetSubtype="0" fill="hold" nodeType="clickEffect">
+                                  <p:stCondLst>
+                                    <p:cond delay="0"/>
+                                  </p:stCondLst>
+                                  <p:childTnLst>
+                                    <p:set>
+                                      <p:cBhvr>
+                                        <p:cTn id="26" dur="1" fill="hold">
+                                          <p:stCondLst>
+                                            <p:cond delay="0"/>
+                                          </p:stCondLst>
+                                        </p:cTn>
+                                        <p:tgtEl>
+                                          <p:spTgt spid="2">
+                                            <p:txEl>
+                                              <p:pRg st="5" end="5"/>
+                                            </p:txEl>
+                                          </p:spTgt>
+                                        </p:tgtEl>
+                                        <p:attrNameLst>
+                                          <p:attrName>style.visibility</p:attrName>
+                                        </p:attrNameLst>
+                                      </p:cBhvr>
+                                      <p:to>
+                                        <p:strVal val="visible"/>
+                                      </p:to>
+                                    </p:set>
+                                  </p:childTnLst>
+                                </p:cTn>
+                              </p:par>
+                            </p:childTnLst>
+                          </p:cTn>
+                        </p:par>
+                      </p:childTnLst>
+                    </p:cTn>
+                  </p:par>
+                  <p:par>
+                    <p:cTn id="27" fill="hold">
+                      <p:stCondLst>
+                        <p:cond delay="indefinite"/>
+                      </p:stCondLst>
+                      <p:childTnLst>
+                        <p:par>
+                          <p:cTn id="28" fill="hold">
+                            <p:stCondLst>
+                              <p:cond delay="0"/>
+                            </p:stCondLst>
+                            <p:childTnLst>
+                              <p:par>
+                                <p:cTn id="29" presetID="1" presetClass="entr" presetSubtype="0" fill="hold" nodeType="clickEffect">
+                                  <p:stCondLst>
+                                    <p:cond delay="0"/>
+                                  </p:stCondLst>
+                                  <p:childTnLst>
+                                    <p:set>
+                                      <p:cBhvr>
+                                        <p:cTn id="30" dur="1" fill="hold">
+                                          <p:stCondLst>
+                                            <p:cond delay="0"/>
+                                          </p:stCondLst>
+                                        </p:cTn>
+                                        <p:tgtEl>
+                                          <p:spTgt spid="2">
+                                            <p:txEl>
+                                              <p:pRg st="6" end="6"/>
+                                            </p:txEl>
+                                          </p:spTgt>
+                                        </p:tgtEl>
+                                        <p:attrNameLst>
+                                          <p:attrName>style.visibility</p:attrName>
+                                        </p:attrNameLst>
+                                      </p:cBhvr>
+                                      <p:to>
+                                        <p:strVal val="visible"/>
+                                      </p:to>
+                                    </p:set>
+                                  </p:childTnLst>
+                                </p:cTn>
+                              </p:par>
+                            </p:childTnLst>
+                          </p:cTn>
+                        </p:par>
+                      </p:childTnLst>
+                    </p:cTn>
+                  </p:par>
+                  <p:par>
+                    <p:cTn id="31" fill="hold">
+                      <p:stCondLst>
+                        <p:cond delay="indefinite"/>
+                      </p:stCondLst>
+                      <p:childTnLst>
+                        <p:par>
+                          <p:cTn id="32" fill="hold">
+                            <p:stCondLst>
+                              <p:cond delay="0"/>
+                            </p:stCondLst>
+                            <p:childTnLst>
+                              <p:par>
+                                <p:cTn id="33" presetID="1" presetClass="entr" presetSubtype="0" fill="hold" nodeType="clickEffect">
+                                  <p:stCondLst>
+                                    <p:cond delay="0"/>
+                                  </p:stCondLst>
+                                  <p:childTnLst>
+                                    <p:set>
+                                      <p:cBhvr>
+                                        <p:cTn id="34" dur="1" fill="hold">
+                                          <p:stCondLst>
+                                            <p:cond delay="0"/>
+                                          </p:stCondLst>
+                                        </p:cTn>
+                                        <p:tgtEl>
+                                          <p:spTgt spid="2">
+                                            <p:txEl>
+                                              <p:pRg st="7" end="7"/>
+                                            </p:txEl>
+                                          </p:spTgt>
+                                        </p:tgtEl>
+                                        <p:attrNameLst>
+                                          <p:attrName>style.visibility</p:attrName>
+                                        </p:attrNameLst>
+                                      </p:cBhvr>
+                                      <p:to>
+                                        <p:strVal val="visible"/>
+                                      </p:to>
+                                    </p:set>
+                                  </p:childTnLst>
+                                </p:cTn>
+                              </p:par>
+                            </p:childTnLst>
+                          </p:cTn>
+                        </p:par>
+                      </p:childTnLst>
+                    </p:cTn>
+                  </p:par>
+                  <p:par>
+                    <p:cTn id="35" fill="hold">
+                      <p:stCondLst>
+                        <p:cond delay="indefinite"/>
+                      </p:stCondLst>
+                      <p:childTnLst>
+                        <p:par>
+                          <p:cTn id="36" fill="hold">
+                            <p:stCondLst>
+                              <p:cond delay="0"/>
+                            </p:stCondLst>
+                            <p:childTnLst>
+                              <p:par>
+                                <p:cTn id="37" presetID="1" presetClass="entr" presetSubtype="0" fill="hold" nodeType="clickEffect">
+                                  <p:stCondLst>
+                                    <p:cond delay="0"/>
+                                  </p:stCondLst>
+                                  <p:childTnLst>
+                                    <p:set>
+                                      <p:cBhvr>
+                                        <p:cTn id="38" dur="1" fill="hold">
+                                          <p:stCondLst>
+                                            <p:cond delay="0"/>
+                                          </p:stCondLst>
+                                        </p:cTn>
+                                        <p:tgtEl>
+                                          <p:spTgt spid="2">
+                                            <p:txEl>
+                                              <p:pRg st="8" end="8"/>
+                                            </p:txEl>
+                                          </p:spTgt>
+                                        </p:tgtEl>
+                                        <p:attrNameLst>
+                                          <p:attrName>style.visibility</p:attrName>
+                                        </p:attrNameLst>
+                                      </p:cBhvr>
+                                      <p:to>
+                                        <p:strVal val="visible"/>
+                                      </p:to>
+                                    </p:set>
+                                  </p:childTnLst>
+                                </p:cTn>
+                              </p:par>
+                            </p:childTnLst>
+                          </p:cTn>
+                        </p:par>
+                      </p:childTnLst>
+                    </p:cTn>
+                  </p:par>
+                </p:childTnLst>
+              </p:cTn>
+              <p:prevCondLst>
+                <p:cond evt="onPrev" delay="0">
+                  <p:tgtEl>
+                    <p:sldTgt/>
+                  </p:tgtEl>
+                </p:cond>
+              </p:prevCondLst>
+              <p:nextCondLst>
+                <p:cond evt="onNext" delay="0">
+                  <p:tgtEl>
+                    <p:sldTgt/>
+                  </p:tgtEl>
+                </p:cond>
+              </p:nextCondLst>
+            </p:seq>
+          </p:childTnLst>
+        </p:cTn>
+      </p:par>
+    </p:tnLst>
+  </p:timing>
+</p:sld>
+</file>
+
+<file path=ppt/slides/slide30.xml><?xml version="1.0" encoding="utf-8"?>
+<p:sld xmlns:a="http://schemas.openxmlformats.org/drawingml/2006/main" xmlns:r="http://schemas.openxmlformats.org/officeDocument/2006/relationships" xmlns:p="http://schemas.openxmlformats.org/presentationml/2006/main">
+  <p:cSld>
+    <p:spTree>
+      <p:nvGrpSpPr>
+        <p:cNvPr id="1" name=""/>
+        <p:cNvGrpSpPr/>
+        <p:nvPr/>
+      </p:nvGrpSpPr>
+      <p:grpSpPr>
+        <a:xfrm>
+          <a:off x="0" y="0"/>
+          <a:ext cx="0" cy="0"/>
+          <a:chOff x="0" y="0"/>
+          <a:chExt cx="0" cy="0"/>
+        </a:xfrm>
+      </p:grpSpPr>
+      <p:sp>
+        <p:nvSpPr>
+          <p:cNvPr id="2" name="标题 1"/>
+          <p:cNvSpPr>
+            <a:spLocks noGrp="1"/>
+          </p:cNvSpPr>
+          <p:nvPr>
+            <p:ph type="title"/>
+          </p:nvPr>
+        </p:nvSpPr>
+        <p:spPr/>
+        <p:txBody>
+          <a:bodyPr/>
+          <a:lstStyle/>
+          <a:p>
+            <a:r>
               <a:rPr lang="zh-CN" altLang="en-US"/>
               <a:t>总结</a:t>
             </a:r>
@@ -10596,7 +11963,7 @@
 </p:sld>
 </file>
 
-<file path=ppt/slides/slide29.xml><?xml version="1.0" encoding="utf-8"?>
+<file path=ppt/slides/slide31.xml><?xml version="1.0" encoding="utf-8"?>
 <p:sld xmlns:a="http://schemas.openxmlformats.org/drawingml/2006/main" xmlns:r="http://schemas.openxmlformats.org/officeDocument/2006/relationships" xmlns:p="http://schemas.openxmlformats.org/presentationml/2006/main">
   <p:cSld>
     <p:spTree>
@@ -10753,10 +12120,141 @@
   <p:clrMapOvr>
     <a:masterClrMapping/>
   </p:clrMapOvr>
+  <p:timing>
+    <p:tnLst>
+      <p:par>
+        <p:cTn id="1" dur="indefinite" restart="never" nodeType="tmRoot">
+          <p:childTnLst>
+            <p:seq concurrent="1" nextAc="seek">
+              <p:cTn id="2" dur="indefinite" nodeType="mainSeq">
+                <p:childTnLst>
+                  <p:par>
+                    <p:cTn id="3" fill="hold">
+                      <p:stCondLst>
+                        <p:cond delay="indefinite"/>
+                      </p:stCondLst>
+                      <p:childTnLst>
+                        <p:par>
+                          <p:cTn id="4" fill="hold">
+                            <p:stCondLst>
+                              <p:cond delay="0"/>
+                            </p:stCondLst>
+                            <p:childTnLst>
+                              <p:par>
+                                <p:cTn id="5" presetID="1" presetClass="entr" presetSubtype="0" fill="hold" grpId="0" nodeType="clickEffect">
+                                  <p:stCondLst>
+                                    <p:cond delay="0"/>
+                                  </p:stCondLst>
+                                  <p:childTnLst>
+                                    <p:set>
+                                      <p:cBhvr>
+                                        <p:cTn id="6" dur="1" fill="hold">
+                                          <p:stCondLst>
+                                            <p:cond delay="0"/>
+                                          </p:stCondLst>
+                                        </p:cTn>
+                                        <p:tgtEl>
+                                          <p:spTgt spid="2">
+                                            <p:txEl>
+                                              <p:pRg st="0" end="0"/>
+                                            </p:txEl>
+                                          </p:spTgt>
+                                        </p:tgtEl>
+                                        <p:attrNameLst>
+                                          <p:attrName>style.visibility</p:attrName>
+                                        </p:attrNameLst>
+                                      </p:cBhvr>
+                                      <p:to>
+                                        <p:strVal val="visible"/>
+                                      </p:to>
+                                    </p:set>
+                                  </p:childTnLst>
+                                </p:cTn>
+                              </p:par>
+                            </p:childTnLst>
+                          </p:cTn>
+                        </p:par>
+                      </p:childTnLst>
+                    </p:cTn>
+                  </p:par>
+                  <p:par>
+                    <p:cTn id="7" fill="hold">
+                      <p:stCondLst>
+                        <p:cond delay="indefinite"/>
+                      </p:stCondLst>
+                      <p:childTnLst>
+                        <p:par>
+                          <p:cTn id="8" fill="hold">
+                            <p:stCondLst>
+                              <p:cond delay="0"/>
+                            </p:stCondLst>
+                            <p:childTnLst>
+                              <p:par>
+                                <p:cTn id="9" presetID="1" presetClass="entr" presetSubtype="0" fill="hold" grpId="0" nodeType="clickEffect">
+                                  <p:stCondLst>
+                                    <p:cond delay="0"/>
+                                  </p:stCondLst>
+                                  <p:childTnLst>
+                                    <p:set>
+                                      <p:cBhvr>
+                                        <p:cTn id="10" dur="1" fill="hold">
+                                          <p:stCondLst>
+                                            <p:cond delay="0"/>
+                                          </p:stCondLst>
+                                        </p:cTn>
+                                        <p:tgtEl>
+                                          <p:spTgt spid="2">
+                                            <p:txEl>
+                                              <p:pRg st="1" end="1"/>
+                                            </p:txEl>
+                                          </p:spTgt>
+                                        </p:tgtEl>
+                                        <p:attrNameLst>
+                                          <p:attrName>style.visibility</p:attrName>
+                                        </p:attrNameLst>
+                                      </p:cBhvr>
+                                      <p:to>
+                                        <p:strVal val="visible"/>
+                                      </p:to>
+                                    </p:set>
+                                  </p:childTnLst>
+                                </p:cTn>
+                              </p:par>
+                            </p:childTnLst>
+                          </p:cTn>
+                        </p:par>
+                      </p:childTnLst>
+                    </p:cTn>
+                  </p:par>
+                </p:childTnLst>
+              </p:cTn>
+              <p:prevCondLst>
+                <p:cond evt="onPrev" delay="0">
+                  <p:tgtEl>
+                    <p:sldTgt/>
+                  </p:tgtEl>
+                </p:cond>
+              </p:prevCondLst>
+              <p:nextCondLst>
+                <p:cond evt="onNext" delay="0">
+                  <p:tgtEl>
+                    <p:sldTgt/>
+                  </p:tgtEl>
+                </p:cond>
+              </p:nextCondLst>
+            </p:seq>
+          </p:childTnLst>
+        </p:cTn>
+      </p:par>
+    </p:tnLst>
+    <p:bldLst>
+      <p:bldP spid="2" grpId="0" build="p"/>
+    </p:bldLst>
+  </p:timing>
 </p:sld>
 </file>
 
-<file path=ppt/slides/slide3.xml><?xml version="1.0" encoding="utf-8"?>
+<file path=ppt/slides/slide32.xml><?xml version="1.0" encoding="utf-8"?>
 <p:sld xmlns:a="http://schemas.openxmlformats.org/drawingml/2006/main" xmlns:r="http://schemas.openxmlformats.org/officeDocument/2006/relationships" xmlns:p="http://schemas.openxmlformats.org/presentationml/2006/main">
   <p:cSld>
     <p:spTree>
@@ -10793,12 +12291,12 @@
               <a:buChar char="•"/>
             </a:pPr>
             <a:r>
-              <a:rPr dirty="0">
-                <a:sym typeface="+mn-ea"/>
-              </a:rPr>
-              <a:t>为什么要学习本课</a:t>
-            </a:r>
-            <a:endParaRPr lang="zh-CN" altLang="en-US" dirty="0"/>
+              <a:rPr>
+                <a:sym typeface="+mn-ea"/>
+                <a:hlinkClick r:id="rId3" action="ppaction://hlinkfile"/>
+              </a:rPr>
+              <a:t>WebGPU学习系列</a:t>
+            </a:r>
           </a:p>
           <a:p>
             <a:pPr marL="285750" indent="-285750">
@@ -10806,22 +12304,19 @@
               <a:buChar char="•"/>
             </a:pPr>
             <a:r>
-              <a:rPr dirty="0">
-                <a:sym typeface="+mn-ea"/>
-              </a:rPr>
-              <a:t>主问题：</a:t>
-            </a:r>
-            <a:r>
-              <a:rPr lang="en-US" dirty="0" err="1">
-                <a:sym typeface="+mn-ea"/>
-              </a:rPr>
-              <a:t>WebGPU</a:t>
-            </a:r>
-            <a:r>
-              <a:rPr dirty="0">
-                <a:sym typeface="+mn-ea"/>
-              </a:rPr>
-              <a:t>是什么</a:t>
+              <a:rPr lang="zh-CN" altLang="en-US"/>
+              <a:t>《</a:t>
+            </a:r>
+            <a:r>
+              <a:rPr lang="en-US" altLang="zh-CN"/>
+              <a:t>WebGL</a:t>
+            </a:r>
+            <a:r>
+              <a:t>编程指南</a:t>
+            </a:r>
+            <a:r>
+              <a:rPr lang="zh-CN" altLang="en-US"/>
+              <a:t>》</a:t>
             </a:r>
           </a:p>
           <a:p>
@@ -10830,136 +12325,127 @@
               <a:buChar char="•"/>
             </a:pPr>
             <a:r>
-              <a:rPr dirty="0">
-                <a:sym typeface="+mn-ea"/>
-              </a:rPr>
-              <a:t>主问题：如何渲染</a:t>
-            </a:r>
-          </a:p>
+              <a:rPr lang="en-US" altLang="zh-CN">
+                <a:hlinkClick r:id="rId4" action="ppaction://hlinkfile"/>
+              </a:rPr>
+              <a:t>WebGPU</a:t>
+            </a:r>
+            <a:r>
+              <a:rPr>
+                <a:hlinkClick r:id="rId4" action="ppaction://hlinkfile"/>
+              </a:rPr>
+              <a:t>规范</a:t>
+            </a:r>
+          </a:p>
+        </p:txBody>
+      </p:sp>
+    </p:spTree>
+    <p:custDataLst>
+      <p:tags r:id="rId1"/>
+    </p:custDataLst>
+  </p:cSld>
+  <p:clrMapOvr>
+    <a:masterClrMapping/>
+  </p:clrMapOvr>
+</p:sld>
+</file>
+
+<file path=ppt/slides/slide33.xml><?xml version="1.0" encoding="utf-8"?>
+<p:sld xmlns:a="http://schemas.openxmlformats.org/drawingml/2006/main" xmlns:r="http://schemas.openxmlformats.org/officeDocument/2006/relationships" xmlns:p="http://schemas.openxmlformats.org/presentationml/2006/main">
+  <p:cSld>
+    <p:spTree>
+      <p:nvGrpSpPr>
+        <p:cNvPr id="1" name=""/>
+        <p:cNvGrpSpPr/>
+        <p:nvPr/>
+      </p:nvGrpSpPr>
+      <p:grpSpPr>
+        <a:xfrm>
+          <a:off x="0" y="0"/>
+          <a:ext cx="0" cy="0"/>
+          <a:chOff x="0" y="0"/>
+          <a:chExt cx="0" cy="0"/>
+        </a:xfrm>
+      </p:grpSpPr>
+      <p:sp>
+        <p:nvSpPr>
+          <p:cNvPr id="2" name="文本占位符 1"/>
+          <p:cNvSpPr>
+            <a:spLocks noGrp="1"/>
+          </p:cNvSpPr>
+          <p:nvPr>
+            <p:ph type="body" idx="1"/>
+          </p:nvPr>
+        </p:nvSpPr>
+        <p:spPr/>
+        <p:txBody>
+          <a:bodyPr/>
+          <a:lstStyle/>
           <a:p>
             <a:pPr marL="285750" indent="-285750">
               <a:buFont typeface="Arial" panose="020B0604020202020204" pitchFamily="34" charset="0"/>
               <a:buChar char="•"/>
             </a:pPr>
             <a:r>
-              <a:rPr dirty="0">
-                <a:sym typeface="+mn-ea"/>
-              </a:rPr>
-              <a:t>主问题：</a:t>
-            </a:r>
-            <a:r>
-              <a:rPr lang="en-US" dirty="0" err="1">
-                <a:sym typeface="+mn-ea"/>
-              </a:rPr>
-              <a:t>WebGPU</a:t>
-            </a:r>
-            <a:r>
-              <a:rPr dirty="0">
-                <a:sym typeface="+mn-ea"/>
-              </a:rPr>
-              <a:t>和</a:t>
-            </a:r>
-            <a:r>
-              <a:rPr lang="en-US" altLang="zh-CN" dirty="0">
-                <a:sym typeface="+mn-ea"/>
-              </a:rPr>
-              <a:t>WebGL</a:t>
-            </a:r>
-            <a:r>
-              <a:rPr dirty="0">
-                <a:sym typeface="+mn-ea"/>
-              </a:rPr>
-              <a:t>是什么关系</a:t>
-            </a:r>
-          </a:p>
-          <a:p>
-            <a:pPr marL="285750" indent="-285750">
+              <a:rPr>
+                <a:sym typeface="+mn-ea"/>
+              </a:rPr>
+              <a:t>无</a:t>
+            </a:r>
+          </a:p>
+        </p:txBody>
+      </p:sp>
+    </p:spTree>
+    <p:custDataLst>
+      <p:tags r:id="rId1"/>
+    </p:custDataLst>
+  </p:cSld>
+  <p:clrMapOvr>
+    <a:masterClrMapping/>
+  </p:clrMapOvr>
+</p:sld>
+</file>
+
+<file path=ppt/slides/slide34.xml><?xml version="1.0" encoding="utf-8"?>
+<p:sld xmlns:a="http://schemas.openxmlformats.org/drawingml/2006/main" xmlns:r="http://schemas.openxmlformats.org/officeDocument/2006/relationships" xmlns:p="http://schemas.openxmlformats.org/presentationml/2006/main">
+  <p:cSld>
+    <p:spTree>
+      <p:nvGrpSpPr>
+        <p:cNvPr id="1" name=""/>
+        <p:cNvGrpSpPr/>
+        <p:nvPr/>
+      </p:nvGrpSpPr>
+      <p:grpSpPr>
+        <a:xfrm>
+          <a:off x="0" y="0"/>
+          <a:ext cx="0" cy="0"/>
+          <a:chOff x="0" y="0"/>
+          <a:chExt cx="0" cy="0"/>
+        </a:xfrm>
+      </p:grpSpPr>
+      <p:sp>
+        <p:nvSpPr>
+          <p:cNvPr id="2" name="文本占位符 1"/>
+          <p:cNvSpPr>
+            <a:spLocks noGrp="1"/>
+          </p:cNvSpPr>
+          <p:nvPr>
+            <p:ph type="body" idx="1"/>
+          </p:nvPr>
+        </p:nvSpPr>
+        <p:spPr/>
+        <p:txBody>
+          <a:bodyPr/>
+          <a:lstStyle/>
+          <a:p>
+            <a:pPr marL="285750" lvl="0" indent="-285750">
               <a:buFont typeface="Arial" panose="020B0604020202020204" pitchFamily="34" charset="0"/>
               <a:buChar char="•"/>
             </a:pPr>
             <a:r>
-              <a:rPr dirty="0">
-                <a:sym typeface="+mn-ea"/>
-              </a:rPr>
-              <a:t>主问题：如何学习</a:t>
-            </a:r>
-            <a:r>
-              <a:rPr lang="en-US" dirty="0" err="1">
-                <a:sym typeface="+mn-ea"/>
-              </a:rPr>
-              <a:t>WebGPU</a:t>
-            </a:r>
-            <a:endParaRPr dirty="0">
-              <a:sym typeface="+mn-ea"/>
-            </a:endParaRPr>
-          </a:p>
-          <a:p>
-            <a:pPr marL="285750" indent="-285750">
-              <a:buFont typeface="Arial" panose="020B0604020202020204" pitchFamily="34" charset="0"/>
-              <a:buChar char="•"/>
-            </a:pPr>
-            <a:r>
               <a:rPr lang="zh-CN" altLang="en-US" dirty="0"/>
-              <a:t>任务</a:t>
-            </a:r>
-            <a:r>
-              <a:rPr dirty="0">
-                <a:sym typeface="+mn-ea"/>
-              </a:rPr>
-              <a:t>：准备开发环境</a:t>
-            </a:r>
-          </a:p>
-          <a:p>
-            <a:pPr marL="285750" indent="-285750">
-              <a:buFont typeface="Arial" panose="020B0604020202020204" pitchFamily="34" charset="0"/>
-              <a:buChar char="•"/>
-            </a:pPr>
-            <a:r>
-              <a:rPr dirty="0">
-                <a:sym typeface="+mn-ea"/>
-              </a:rPr>
-              <a:t>主问题：如何使用</a:t>
-            </a:r>
-            <a:r>
-              <a:rPr lang="en-US" altLang="zh-CN" dirty="0" err="1">
-                <a:sym typeface="+mn-ea"/>
-              </a:rPr>
-              <a:t>WebGPU</a:t>
-            </a:r>
-            <a:r>
-              <a:rPr dirty="0">
-                <a:sym typeface="+mn-ea"/>
-              </a:rPr>
-              <a:t>实现</a:t>
-            </a:r>
-            <a:r>
-              <a:rPr lang="en-US" altLang="zh-CN" dirty="0">
-                <a:sym typeface="+mn-ea"/>
-              </a:rPr>
-              <a:t>“</a:t>
-            </a:r>
-            <a:r>
-              <a:rPr dirty="0">
-                <a:sym typeface="+mn-ea"/>
-              </a:rPr>
-              <a:t>绘制一个三角形</a:t>
-            </a:r>
-            <a:r>
-              <a:rPr lang="en-US" altLang="zh-CN" dirty="0">
-                <a:sym typeface="+mn-ea"/>
-              </a:rPr>
-              <a:t>”</a:t>
-            </a:r>
-            <a:endParaRPr dirty="0">
-              <a:sym typeface="+mn-ea"/>
-            </a:endParaRPr>
-          </a:p>
-          <a:p>
-            <a:pPr marL="285750" indent="-285750">
-              <a:buFont typeface="Arial" panose="020B0604020202020204" pitchFamily="34" charset="0"/>
-              <a:buChar char="•"/>
-            </a:pPr>
-            <a:endParaRPr lang="en-US" altLang="zh-CN" dirty="0"/>
+              <a:t>三角函数、向量和矩阵</a:t>
+            </a:r>
           </a:p>
         </p:txBody>
       </p:sp>
@@ -10980,8 +12466,263 @@
           <a:p>
             <a:r>
               <a:rPr lang="zh-CN" altLang="en-US"/>
-              <a:t>内容预览</a:t>
-            </a:r>
+              <a:t>下节课预告</a:t>
+            </a:r>
+          </a:p>
+        </p:txBody>
+      </p:sp>
+    </p:spTree>
+    <p:custDataLst>
+      <p:tags r:id="rId1"/>
+    </p:custDataLst>
+  </p:cSld>
+  <p:clrMapOvr>
+    <a:masterClrMapping/>
+  </p:clrMapOvr>
+</p:sld>
+</file>
+
+<file path=ppt/slides/slide35.xml><?xml version="1.0" encoding="utf-8"?>
+<p:sld xmlns:a="http://schemas.openxmlformats.org/drawingml/2006/main" xmlns:r="http://schemas.openxmlformats.org/officeDocument/2006/relationships" xmlns:p="http://schemas.openxmlformats.org/presentationml/2006/main">
+  <p:cSld>
+    <p:spTree>
+      <p:nvGrpSpPr>
+        <p:cNvPr id="1" name=""/>
+        <p:cNvGrpSpPr/>
+        <p:nvPr/>
+      </p:nvGrpSpPr>
+      <p:grpSpPr>
+        <a:xfrm>
+          <a:off x="0" y="0"/>
+          <a:ext cx="0" cy="0"/>
+          <a:chOff x="0" y="0"/>
+          <a:chExt cx="0" cy="0"/>
+        </a:xfrm>
+      </p:grpSpPr>
+      <p:sp>
+        <p:nvSpPr>
+          <p:cNvPr id="2" name="标题 1"/>
+          <p:cNvSpPr>
+            <a:spLocks noGrp="1"/>
+          </p:cNvSpPr>
+          <p:nvPr>
+            <p:ph type="title"/>
+          </p:nvPr>
+        </p:nvSpPr>
+        <p:spPr/>
+        <p:txBody>
+          <a:bodyPr/>
+          <a:lstStyle/>
+          <a:p>
+            <a:r>
+              <a:rPr lang="zh-CN" altLang="en-US" dirty="0"/>
+              <a:t>问答</a:t>
+            </a:r>
+          </a:p>
+        </p:txBody>
+      </p:sp>
+    </p:spTree>
+    <p:custDataLst>
+      <p:tags r:id="rId1"/>
+    </p:custDataLst>
+    <p:extLst>
+      <p:ext uri="{BB962C8B-B14F-4D97-AF65-F5344CB8AC3E}">
+        <p14:creationId xmlns:p14="http://schemas.microsoft.com/office/powerpoint/2010/main" val="2041315174"/>
+      </p:ext>
+    </p:extLst>
+  </p:cSld>
+  <p:clrMapOvr>
+    <a:masterClrMapping/>
+  </p:clrMapOvr>
+</p:sld>
+</file>
+
+<file path=ppt/slides/slide36.xml><?xml version="1.0" encoding="utf-8"?>
+<p:sld xmlns:a="http://schemas.openxmlformats.org/drawingml/2006/main" xmlns:r="http://schemas.openxmlformats.org/officeDocument/2006/relationships" xmlns:p="http://schemas.openxmlformats.org/presentationml/2006/main">
+  <p:cSld>
+    <p:spTree>
+      <p:nvGrpSpPr>
+        <p:cNvPr id="1" name=""/>
+        <p:cNvGrpSpPr/>
+        <p:nvPr/>
+      </p:nvGrpSpPr>
+      <p:grpSpPr>
+        <a:xfrm>
+          <a:off x="0" y="0"/>
+          <a:ext cx="0" cy="0"/>
+          <a:chOff x="0" y="0"/>
+          <a:chExt cx="0" cy="0"/>
+        </a:xfrm>
+      </p:grpSpPr>
+      <p:sp>
+        <p:nvSpPr>
+          <p:cNvPr id="2" name="文本占位符 1"/>
+          <p:cNvSpPr>
+            <a:spLocks noGrp="1"/>
+          </p:cNvSpPr>
+          <p:nvPr>
+            <p:ph type="body" idx="1"/>
+          </p:nvPr>
+        </p:nvSpPr>
+        <p:spPr/>
+        <p:txBody>
+          <a:bodyPr/>
+          <a:lstStyle/>
+          <a:p>
+            <a:pPr marL="285750" indent="-285750">
+              <a:buFont typeface="Arial" panose="020B0604020202020204" pitchFamily="34" charset="0"/>
+              <a:buChar char="•"/>
+            </a:pPr>
+            <a:endParaRPr lang="en" altLang="zh-CN" dirty="0"/>
+          </a:p>
+        </p:txBody>
+      </p:sp>
+      <p:sp>
+        <p:nvSpPr>
+          <p:cNvPr id="3" name="标题 2"/>
+          <p:cNvSpPr>
+            <a:spLocks noGrp="1"/>
+          </p:cNvSpPr>
+          <p:nvPr>
+            <p:ph type="title"/>
+          </p:nvPr>
+        </p:nvSpPr>
+        <p:spPr/>
+        <p:txBody>
+          <a:bodyPr/>
+          <a:lstStyle/>
+          <a:p>
+            <a:r>
+              <a:t>问答</a:t>
+            </a:r>
+          </a:p>
+        </p:txBody>
+      </p:sp>
+    </p:spTree>
+    <p:custDataLst>
+      <p:tags r:id="rId1"/>
+    </p:custDataLst>
+  </p:cSld>
+  <p:clrMapOvr>
+    <a:masterClrMapping/>
+  </p:clrMapOvr>
+</p:sld>
+</file>
+
+<file path=ppt/slides/slide37.xml><?xml version="1.0" encoding="utf-8"?>
+<p:sld xmlns:a="http://schemas.openxmlformats.org/drawingml/2006/main" xmlns:r="http://schemas.openxmlformats.org/officeDocument/2006/relationships" xmlns:p="http://schemas.openxmlformats.org/presentationml/2006/main">
+  <p:cSld>
+    <p:spTree>
+      <p:nvGrpSpPr>
+        <p:cNvPr id="1" name=""/>
+        <p:cNvGrpSpPr/>
+        <p:nvPr/>
+      </p:nvGrpSpPr>
+      <p:grpSpPr>
+        <a:xfrm>
+          <a:off x="0" y="0"/>
+          <a:ext cx="0" cy="0"/>
+          <a:chOff x="0" y="0"/>
+          <a:chExt cx="0" cy="0"/>
+        </a:xfrm>
+      </p:grpSpPr>
+    </p:spTree>
+    <p:custDataLst>
+      <p:tags r:id="rId1"/>
+    </p:custDataLst>
+  </p:cSld>
+  <p:clrMapOvr>
+    <a:masterClrMapping/>
+  </p:clrMapOvr>
+</p:sld>
+</file>
+
+<file path=ppt/slides/slide4.xml><?xml version="1.0" encoding="utf-8"?>
+<p:sld xmlns:a="http://schemas.openxmlformats.org/drawingml/2006/main" xmlns:r="http://schemas.openxmlformats.org/officeDocument/2006/relationships" xmlns:p="http://schemas.openxmlformats.org/presentationml/2006/main">
+  <p:cSld>
+    <p:spTree>
+      <p:nvGrpSpPr>
+        <p:cNvPr id="1" name=""/>
+        <p:cNvGrpSpPr/>
+        <p:nvPr/>
+      </p:nvGrpSpPr>
+      <p:grpSpPr>
+        <a:xfrm>
+          <a:off x="0" y="0"/>
+          <a:ext cx="0" cy="0"/>
+          <a:chOff x="0" y="0"/>
+          <a:chExt cx="0" cy="0"/>
+        </a:xfrm>
+      </p:grpSpPr>
+      <p:sp>
+        <p:nvSpPr>
+          <p:cNvPr id="2" name="文本占位符 1"/>
+          <p:cNvSpPr>
+            <a:spLocks noGrp="1"/>
+          </p:cNvSpPr>
+          <p:nvPr>
+            <p:ph type="body" idx="1"/>
+          </p:nvPr>
+        </p:nvSpPr>
+        <p:spPr/>
+        <p:txBody>
+          <a:bodyPr/>
+          <a:lstStyle/>
+          <a:p>
+            <a:pPr marL="285750" indent="-285750">
+              <a:buFont typeface="Arial" panose="020B0604020202020204" pitchFamily="34" charset="0"/>
+              <a:buChar char="•"/>
+            </a:pPr>
+            <a:r>
+              <a:rPr dirty="0">
+                <a:sym typeface="+mn-ea"/>
+              </a:rPr>
+              <a:t>为什么要学习</a:t>
+            </a:r>
+            <a:r>
+              <a:rPr lang="zh-CN" altLang="en-US" dirty="0">
+                <a:sym typeface="+mn-ea"/>
+              </a:rPr>
+              <a:t>真实感</a:t>
+            </a:r>
+            <a:r>
+              <a:rPr dirty="0">
+                <a:sym typeface="+mn-ea"/>
+              </a:rPr>
+              <a:t>渲染？</a:t>
+            </a:r>
+          </a:p>
+          <a:p>
+            <a:pPr marL="285750" indent="-285750">
+              <a:buFont typeface="Arial" panose="020B0604020202020204" pitchFamily="34" charset="0"/>
+              <a:buChar char="•"/>
+            </a:pPr>
+            <a:endParaRPr lang="zh-CN" altLang="en-US" dirty="0"/>
+          </a:p>
+        </p:txBody>
+      </p:sp>
+      <p:sp>
+        <p:nvSpPr>
+          <p:cNvPr id="3" name="标题 2"/>
+          <p:cNvSpPr>
+            <a:spLocks noGrp="1"/>
+          </p:cNvSpPr>
+          <p:nvPr>
+            <p:ph type="title"/>
+          </p:nvPr>
+        </p:nvSpPr>
+        <p:spPr/>
+        <p:txBody>
+          <a:bodyPr/>
+          <a:lstStyle/>
+          <a:p>
+            <a:r>
+              <a:rPr lang="zh-CN" altLang="en-US" dirty="0"/>
+              <a:t>回顾相关课程内容</a:t>
+            </a:r>
+            <a:endParaRPr dirty="0">
+              <a:sym typeface="+mn-ea"/>
+            </a:endParaRPr>
           </a:p>
         </p:txBody>
       </p:sp>
@@ -11029,252 +12770,7 @@
                                         <p:tgtEl>
                                           <p:spTgt spid="2">
                                             <p:txEl>
-                                              <p:pRg st="1" end="1"/>
-                                            </p:txEl>
-                                          </p:spTgt>
-                                        </p:tgtEl>
-                                        <p:attrNameLst>
-                                          <p:attrName>style.visibility</p:attrName>
-                                        </p:attrNameLst>
-                                      </p:cBhvr>
-                                      <p:to>
-                                        <p:strVal val="visible"/>
-                                      </p:to>
-                                    </p:set>
-                                  </p:childTnLst>
-                                </p:cTn>
-                              </p:par>
-                            </p:childTnLst>
-                          </p:cTn>
-                        </p:par>
-                      </p:childTnLst>
-                    </p:cTn>
-                  </p:par>
-                  <p:par>
-                    <p:cTn id="7" fill="hold">
-                      <p:stCondLst>
-                        <p:cond delay="indefinite"/>
-                      </p:stCondLst>
-                      <p:childTnLst>
-                        <p:par>
-                          <p:cTn id="8" fill="hold">
-                            <p:stCondLst>
-                              <p:cond delay="0"/>
-                            </p:stCondLst>
-                            <p:childTnLst>
-                              <p:par>
-                                <p:cTn id="9" presetID="1" presetClass="entr" presetSubtype="0" fill="hold" nodeType="clickEffect">
-                                  <p:stCondLst>
-                                    <p:cond delay="0"/>
-                                  </p:stCondLst>
-                                  <p:childTnLst>
-                                    <p:set>
-                                      <p:cBhvr>
-                                        <p:cTn id="10" dur="1" fill="hold">
-                                          <p:stCondLst>
-                                            <p:cond delay="0"/>
-                                          </p:stCondLst>
-                                        </p:cTn>
-                                        <p:tgtEl>
-                                          <p:spTgt spid="2">
-                                            <p:txEl>
-                                              <p:pRg st="2" end="2"/>
-                                            </p:txEl>
-                                          </p:spTgt>
-                                        </p:tgtEl>
-                                        <p:attrNameLst>
-                                          <p:attrName>style.visibility</p:attrName>
-                                        </p:attrNameLst>
-                                      </p:cBhvr>
-                                      <p:to>
-                                        <p:strVal val="visible"/>
-                                      </p:to>
-                                    </p:set>
-                                  </p:childTnLst>
-                                </p:cTn>
-                              </p:par>
-                            </p:childTnLst>
-                          </p:cTn>
-                        </p:par>
-                      </p:childTnLst>
-                    </p:cTn>
-                  </p:par>
-                  <p:par>
-                    <p:cTn id="11" fill="hold">
-                      <p:stCondLst>
-                        <p:cond delay="indefinite"/>
-                      </p:stCondLst>
-                      <p:childTnLst>
-                        <p:par>
-                          <p:cTn id="12" fill="hold">
-                            <p:stCondLst>
-                              <p:cond delay="0"/>
-                            </p:stCondLst>
-                            <p:childTnLst>
-                              <p:par>
-                                <p:cTn id="13" presetID="1" presetClass="entr" presetSubtype="0" fill="hold" nodeType="clickEffect">
-                                  <p:stCondLst>
-                                    <p:cond delay="0"/>
-                                  </p:stCondLst>
-                                  <p:childTnLst>
-                                    <p:set>
-                                      <p:cBhvr>
-                                        <p:cTn id="14" dur="1" fill="hold">
-                                          <p:stCondLst>
-                                            <p:cond delay="0"/>
-                                          </p:stCondLst>
-                                        </p:cTn>
-                                        <p:tgtEl>
-                                          <p:spTgt spid="2">
-                                            <p:txEl>
-                                              <p:pRg st="3" end="3"/>
-                                            </p:txEl>
-                                          </p:spTgt>
-                                        </p:tgtEl>
-                                        <p:attrNameLst>
-                                          <p:attrName>style.visibility</p:attrName>
-                                        </p:attrNameLst>
-                                      </p:cBhvr>
-                                      <p:to>
-                                        <p:strVal val="visible"/>
-                                      </p:to>
-                                    </p:set>
-                                  </p:childTnLst>
-                                </p:cTn>
-                              </p:par>
-                            </p:childTnLst>
-                          </p:cTn>
-                        </p:par>
-                      </p:childTnLst>
-                    </p:cTn>
-                  </p:par>
-                  <p:par>
-                    <p:cTn id="15" fill="hold">
-                      <p:stCondLst>
-                        <p:cond delay="indefinite"/>
-                      </p:stCondLst>
-                      <p:childTnLst>
-                        <p:par>
-                          <p:cTn id="16" fill="hold">
-                            <p:stCondLst>
-                              <p:cond delay="0"/>
-                            </p:stCondLst>
-                            <p:childTnLst>
-                              <p:par>
-                                <p:cTn id="17" presetID="1" presetClass="entr" presetSubtype="0" fill="hold" nodeType="clickEffect">
-                                  <p:stCondLst>
-                                    <p:cond delay="0"/>
-                                  </p:stCondLst>
-                                  <p:childTnLst>
-                                    <p:set>
-                                      <p:cBhvr>
-                                        <p:cTn id="18" dur="1" fill="hold">
-                                          <p:stCondLst>
-                                            <p:cond delay="0"/>
-                                          </p:stCondLst>
-                                        </p:cTn>
-                                        <p:tgtEl>
-                                          <p:spTgt spid="2">
-                                            <p:txEl>
-                                              <p:pRg st="4" end="4"/>
-                                            </p:txEl>
-                                          </p:spTgt>
-                                        </p:tgtEl>
-                                        <p:attrNameLst>
-                                          <p:attrName>style.visibility</p:attrName>
-                                        </p:attrNameLst>
-                                      </p:cBhvr>
-                                      <p:to>
-                                        <p:strVal val="visible"/>
-                                      </p:to>
-                                    </p:set>
-                                  </p:childTnLst>
-                                </p:cTn>
-                              </p:par>
-                            </p:childTnLst>
-                          </p:cTn>
-                        </p:par>
-                      </p:childTnLst>
-                    </p:cTn>
-                  </p:par>
-                  <p:par>
-                    <p:cTn id="19" fill="hold">
-                      <p:stCondLst>
-                        <p:cond delay="indefinite"/>
-                      </p:stCondLst>
-                      <p:childTnLst>
-                        <p:par>
-                          <p:cTn id="20" fill="hold">
-                            <p:stCondLst>
-                              <p:cond delay="0"/>
-                            </p:stCondLst>
-                            <p:childTnLst>
-                              <p:par>
-                                <p:cTn id="21" presetID="1" presetClass="entr" presetSubtype="0" fill="hold" nodeType="clickEffect">
-                                  <p:stCondLst>
-                                    <p:cond delay="0"/>
-                                  </p:stCondLst>
-                                  <p:childTnLst>
-                                    <p:set>
-                                      <p:cBhvr>
-                                        <p:cTn id="22" dur="1" fill="hold">
-                                          <p:stCondLst>
-                                            <p:cond delay="0"/>
-                                          </p:stCondLst>
-                                        </p:cTn>
-                                        <p:tgtEl>
-                                          <p:spTgt spid="2">
-                                            <p:txEl>
-                                              <p:pRg st="5" end="5"/>
-                                            </p:txEl>
-                                          </p:spTgt>
-                                        </p:tgtEl>
-                                        <p:attrNameLst>
-                                          <p:attrName>style.visibility</p:attrName>
-                                        </p:attrNameLst>
-                                      </p:cBhvr>
-                                      <p:to>
-                                        <p:strVal val="visible"/>
-                                      </p:to>
-                                    </p:set>
-                                  </p:childTnLst>
-                                </p:cTn>
-                              </p:par>
-                            </p:childTnLst>
-                          </p:cTn>
-                        </p:par>
-                      </p:childTnLst>
-                    </p:cTn>
-                  </p:par>
-                  <p:par>
-                    <p:cTn id="23" fill="hold">
-                      <p:stCondLst>
-                        <p:cond delay="indefinite"/>
-                      </p:stCondLst>
-                      <p:childTnLst>
-                        <p:par>
-                          <p:cTn id="24" fill="hold">
-                            <p:stCondLst>
-                              <p:cond delay="0"/>
-                            </p:stCondLst>
-                            <p:childTnLst>
-                              <p:par>
-                                <p:cTn id="25" presetID="1" presetClass="entr" presetSubtype="0" fill="hold" nodeType="clickEffect">
-                                  <p:stCondLst>
-                                    <p:cond delay="0"/>
-                                  </p:stCondLst>
-                                  <p:childTnLst>
-                                    <p:set>
-                                      <p:cBhvr>
-                                        <p:cTn id="26" dur="1" fill="hold">
-                                          <p:stCondLst>
-                                            <p:cond delay="0"/>
-                                          </p:stCondLst>
-                                        </p:cTn>
-                                        <p:tgtEl>
-                                          <p:spTgt spid="2">
-                                            <p:txEl>
-                                              <p:pRg st="6" end="6"/>
+                                              <p:pRg st="0" end="0"/>
                                             </p:txEl>
                                           </p:spTgt>
                                         </p:tgtEl>
@@ -11320,433 +12816,6 @@
 </p:sld>
 </file>
 
-<file path=ppt/slides/slide30.xml><?xml version="1.0" encoding="utf-8"?>
-<p:sld xmlns:a="http://schemas.openxmlformats.org/drawingml/2006/main" xmlns:r="http://schemas.openxmlformats.org/officeDocument/2006/relationships" xmlns:p="http://schemas.openxmlformats.org/presentationml/2006/main">
-  <p:cSld>
-    <p:spTree>
-      <p:nvGrpSpPr>
-        <p:cNvPr id="1" name=""/>
-        <p:cNvGrpSpPr/>
-        <p:nvPr/>
-      </p:nvGrpSpPr>
-      <p:grpSpPr>
-        <a:xfrm>
-          <a:off x="0" y="0"/>
-          <a:ext cx="0" cy="0"/>
-          <a:chOff x="0" y="0"/>
-          <a:chExt cx="0" cy="0"/>
-        </a:xfrm>
-      </p:grpSpPr>
-      <p:sp>
-        <p:nvSpPr>
-          <p:cNvPr id="2" name="文本占位符 1"/>
-          <p:cNvSpPr>
-            <a:spLocks noGrp="1"/>
-          </p:cNvSpPr>
-          <p:nvPr>
-            <p:ph type="body" idx="1"/>
-          </p:nvPr>
-        </p:nvSpPr>
-        <p:spPr/>
-        <p:txBody>
-          <a:bodyPr/>
-          <a:lstStyle/>
-          <a:p>
-            <a:pPr marL="285750" indent="-285750">
-              <a:buFont typeface="Arial" panose="020B0604020202020204" pitchFamily="34" charset="0"/>
-              <a:buChar char="•"/>
-            </a:pPr>
-            <a:r>
-              <a:rPr>
-                <a:sym typeface="+mn-ea"/>
-                <a:hlinkClick r:id="rId3" action="ppaction://hlinkfile"/>
-              </a:rPr>
-              <a:t>WebGPU学习系列</a:t>
-            </a:r>
-          </a:p>
-          <a:p>
-            <a:pPr marL="285750" indent="-285750">
-              <a:buFont typeface="Arial" panose="020B0604020202020204" pitchFamily="34" charset="0"/>
-              <a:buChar char="•"/>
-            </a:pPr>
-            <a:r>
-              <a:rPr lang="zh-CN" altLang="en-US"/>
-              <a:t>《</a:t>
-            </a:r>
-            <a:r>
-              <a:rPr lang="en-US" altLang="zh-CN"/>
-              <a:t>WebGL</a:t>
-            </a:r>
-            <a:r>
-              <a:t>编程指南</a:t>
-            </a:r>
-            <a:r>
-              <a:rPr lang="zh-CN" altLang="en-US"/>
-              <a:t>》</a:t>
-            </a:r>
-          </a:p>
-          <a:p>
-            <a:pPr marL="285750" indent="-285750">
-              <a:buFont typeface="Arial" panose="020B0604020202020204" pitchFamily="34" charset="0"/>
-              <a:buChar char="•"/>
-            </a:pPr>
-            <a:r>
-              <a:rPr lang="en-US" altLang="zh-CN">
-                <a:hlinkClick r:id="rId4" action="ppaction://hlinkfile"/>
-              </a:rPr>
-              <a:t>WebGPU</a:t>
-            </a:r>
-            <a:r>
-              <a:rPr>
-                <a:hlinkClick r:id="rId4" action="ppaction://hlinkfile"/>
-              </a:rPr>
-              <a:t>规范</a:t>
-            </a:r>
-          </a:p>
-        </p:txBody>
-      </p:sp>
-    </p:spTree>
-    <p:custDataLst>
-      <p:tags r:id="rId1"/>
-    </p:custDataLst>
-  </p:cSld>
-  <p:clrMapOvr>
-    <a:masterClrMapping/>
-  </p:clrMapOvr>
-</p:sld>
-</file>
-
-<file path=ppt/slides/slide31.xml><?xml version="1.0" encoding="utf-8"?>
-<p:sld xmlns:a="http://schemas.openxmlformats.org/drawingml/2006/main" xmlns:r="http://schemas.openxmlformats.org/officeDocument/2006/relationships" xmlns:p="http://schemas.openxmlformats.org/presentationml/2006/main">
-  <p:cSld>
-    <p:spTree>
-      <p:nvGrpSpPr>
-        <p:cNvPr id="1" name=""/>
-        <p:cNvGrpSpPr/>
-        <p:nvPr/>
-      </p:nvGrpSpPr>
-      <p:grpSpPr>
-        <a:xfrm>
-          <a:off x="0" y="0"/>
-          <a:ext cx="0" cy="0"/>
-          <a:chOff x="0" y="0"/>
-          <a:chExt cx="0" cy="0"/>
-        </a:xfrm>
-      </p:grpSpPr>
-      <p:sp>
-        <p:nvSpPr>
-          <p:cNvPr id="2" name="文本占位符 1"/>
-          <p:cNvSpPr>
-            <a:spLocks noGrp="1"/>
-          </p:cNvSpPr>
-          <p:nvPr>
-            <p:ph type="body" idx="1"/>
-          </p:nvPr>
-        </p:nvSpPr>
-        <p:spPr/>
-        <p:txBody>
-          <a:bodyPr/>
-          <a:lstStyle/>
-          <a:p>
-            <a:pPr marL="285750" indent="-285750">
-              <a:buFont typeface="Arial" panose="020B0604020202020204" pitchFamily="34" charset="0"/>
-              <a:buChar char="•"/>
-            </a:pPr>
-            <a:r>
-              <a:rPr>
-                <a:sym typeface="+mn-ea"/>
-              </a:rPr>
-              <a:t>无</a:t>
-            </a:r>
-          </a:p>
-        </p:txBody>
-      </p:sp>
-    </p:spTree>
-    <p:custDataLst>
-      <p:tags r:id="rId1"/>
-    </p:custDataLst>
-  </p:cSld>
-  <p:clrMapOvr>
-    <a:masterClrMapping/>
-  </p:clrMapOvr>
-</p:sld>
-</file>
-
-<file path=ppt/slides/slide32.xml><?xml version="1.0" encoding="utf-8"?>
-<p:sld xmlns:a="http://schemas.openxmlformats.org/drawingml/2006/main" xmlns:r="http://schemas.openxmlformats.org/officeDocument/2006/relationships" xmlns:p="http://schemas.openxmlformats.org/presentationml/2006/main">
-  <p:cSld>
-    <p:spTree>
-      <p:nvGrpSpPr>
-        <p:cNvPr id="1" name=""/>
-        <p:cNvGrpSpPr/>
-        <p:nvPr/>
-      </p:nvGrpSpPr>
-      <p:grpSpPr>
-        <a:xfrm>
-          <a:off x="0" y="0"/>
-          <a:ext cx="0" cy="0"/>
-          <a:chOff x="0" y="0"/>
-          <a:chExt cx="0" cy="0"/>
-        </a:xfrm>
-      </p:grpSpPr>
-      <p:sp>
-        <p:nvSpPr>
-          <p:cNvPr id="2" name="文本占位符 1"/>
-          <p:cNvSpPr>
-            <a:spLocks noGrp="1"/>
-          </p:cNvSpPr>
-          <p:nvPr>
-            <p:ph type="body" idx="1"/>
-          </p:nvPr>
-        </p:nvSpPr>
-        <p:spPr/>
-        <p:txBody>
-          <a:bodyPr/>
-          <a:lstStyle/>
-          <a:p>
-            <a:pPr marL="285750" lvl="0" indent="-285750">
-              <a:buFont typeface="Arial" panose="020B0604020202020204" pitchFamily="34" charset="0"/>
-              <a:buChar char="•"/>
-            </a:pPr>
-            <a:r>
-              <a:rPr lang="zh-CN" altLang="en-US" dirty="0"/>
-              <a:t>三角函数、向量和矩阵</a:t>
-            </a:r>
-          </a:p>
-        </p:txBody>
-      </p:sp>
-      <p:sp>
-        <p:nvSpPr>
-          <p:cNvPr id="3" name="标题 2"/>
-          <p:cNvSpPr>
-            <a:spLocks noGrp="1"/>
-          </p:cNvSpPr>
-          <p:nvPr>
-            <p:ph type="title"/>
-          </p:nvPr>
-        </p:nvSpPr>
-        <p:spPr/>
-        <p:txBody>
-          <a:bodyPr/>
-          <a:lstStyle/>
-          <a:p>
-            <a:r>
-              <a:rPr lang="zh-CN" altLang="en-US"/>
-              <a:t>下节课预告</a:t>
-            </a:r>
-          </a:p>
-        </p:txBody>
-      </p:sp>
-    </p:spTree>
-    <p:custDataLst>
-      <p:tags r:id="rId1"/>
-    </p:custDataLst>
-  </p:cSld>
-  <p:clrMapOvr>
-    <a:masterClrMapping/>
-  </p:clrMapOvr>
-</p:sld>
-</file>
-
-<file path=ppt/slides/slide33.xml><?xml version="1.0" encoding="utf-8"?>
-<p:sld xmlns:a="http://schemas.openxmlformats.org/drawingml/2006/main" xmlns:r="http://schemas.openxmlformats.org/officeDocument/2006/relationships" xmlns:p="http://schemas.openxmlformats.org/presentationml/2006/main">
-  <p:cSld>
-    <p:spTree>
-      <p:nvGrpSpPr>
-        <p:cNvPr id="1" name=""/>
-        <p:cNvGrpSpPr/>
-        <p:nvPr/>
-      </p:nvGrpSpPr>
-      <p:grpSpPr>
-        <a:xfrm>
-          <a:off x="0" y="0"/>
-          <a:ext cx="0" cy="0"/>
-          <a:chOff x="0" y="0"/>
-          <a:chExt cx="0" cy="0"/>
-        </a:xfrm>
-      </p:grpSpPr>
-      <p:sp>
-        <p:nvSpPr>
-          <p:cNvPr id="2" name="文本占位符 1"/>
-          <p:cNvSpPr>
-            <a:spLocks noGrp="1"/>
-          </p:cNvSpPr>
-          <p:nvPr>
-            <p:ph type="body" idx="1"/>
-          </p:nvPr>
-        </p:nvSpPr>
-        <p:spPr/>
-        <p:txBody>
-          <a:bodyPr/>
-          <a:lstStyle/>
-          <a:p>
-            <a:pPr marL="285750" indent="-285750">
-              <a:buFont typeface="Arial" panose="020B0604020202020204" pitchFamily="34" charset="0"/>
-              <a:buChar char="•"/>
-            </a:pPr>
-            <a:endParaRPr lang="en" altLang="zh-CN" dirty="0"/>
-          </a:p>
-        </p:txBody>
-      </p:sp>
-      <p:sp>
-        <p:nvSpPr>
-          <p:cNvPr id="3" name="标题 2"/>
-          <p:cNvSpPr>
-            <a:spLocks noGrp="1"/>
-          </p:cNvSpPr>
-          <p:nvPr>
-            <p:ph type="title"/>
-          </p:nvPr>
-        </p:nvSpPr>
-        <p:spPr/>
-        <p:txBody>
-          <a:bodyPr/>
-          <a:lstStyle/>
-          <a:p>
-            <a:r>
-              <a:t>问答</a:t>
-            </a:r>
-          </a:p>
-        </p:txBody>
-      </p:sp>
-    </p:spTree>
-    <p:custDataLst>
-      <p:tags r:id="rId1"/>
-    </p:custDataLst>
-  </p:cSld>
-  <p:clrMapOvr>
-    <a:masterClrMapping/>
-  </p:clrMapOvr>
-</p:sld>
-</file>
-
-<file path=ppt/slides/slide34.xml><?xml version="1.0" encoding="utf-8"?>
-<p:sld xmlns:a="http://schemas.openxmlformats.org/drawingml/2006/main" xmlns:r="http://schemas.openxmlformats.org/officeDocument/2006/relationships" xmlns:p="http://schemas.openxmlformats.org/presentationml/2006/main">
-  <p:cSld>
-    <p:spTree>
-      <p:nvGrpSpPr>
-        <p:cNvPr id="1" name=""/>
-        <p:cNvGrpSpPr/>
-        <p:nvPr/>
-      </p:nvGrpSpPr>
-      <p:grpSpPr>
-        <a:xfrm>
-          <a:off x="0" y="0"/>
-          <a:ext cx="0" cy="0"/>
-          <a:chOff x="0" y="0"/>
-          <a:chExt cx="0" cy="0"/>
-        </a:xfrm>
-      </p:grpSpPr>
-    </p:spTree>
-    <p:custDataLst>
-      <p:tags r:id="rId1"/>
-    </p:custDataLst>
-  </p:cSld>
-  <p:clrMapOvr>
-    <a:masterClrMapping/>
-  </p:clrMapOvr>
-</p:sld>
-</file>
-
-<file path=ppt/slides/slide4.xml><?xml version="1.0" encoding="utf-8"?>
-<p:sld xmlns:a="http://schemas.openxmlformats.org/drawingml/2006/main" xmlns:r="http://schemas.openxmlformats.org/officeDocument/2006/relationships" xmlns:p="http://schemas.openxmlformats.org/presentationml/2006/main">
-  <p:cSld>
-    <p:spTree>
-      <p:nvGrpSpPr>
-        <p:cNvPr id="1" name=""/>
-        <p:cNvGrpSpPr/>
-        <p:nvPr/>
-      </p:nvGrpSpPr>
-      <p:grpSpPr>
-        <a:xfrm>
-          <a:off x="0" y="0"/>
-          <a:ext cx="0" cy="0"/>
-          <a:chOff x="0" y="0"/>
-          <a:chExt cx="0" cy="0"/>
-        </a:xfrm>
-      </p:grpSpPr>
-      <p:sp>
-        <p:nvSpPr>
-          <p:cNvPr id="2" name="文本占位符 1"/>
-          <p:cNvSpPr>
-            <a:spLocks noGrp="1"/>
-          </p:cNvSpPr>
-          <p:nvPr>
-            <p:ph type="body" idx="1"/>
-          </p:nvPr>
-        </p:nvSpPr>
-        <p:spPr/>
-        <p:txBody>
-          <a:bodyPr/>
-          <a:lstStyle/>
-          <a:p>
-            <a:pPr marL="285750" indent="-285750">
-              <a:buFont typeface="Arial" panose="020B0604020202020204" pitchFamily="34" charset="0"/>
-              <a:buChar char="•"/>
-            </a:pPr>
-            <a:r>
-              <a:rPr dirty="0">
-                <a:sym typeface="+mn-ea"/>
-              </a:rPr>
-              <a:t>为什么要学习</a:t>
-            </a:r>
-            <a:r>
-              <a:rPr lang="zh-CN" altLang="en-US" dirty="0">
-                <a:sym typeface="+mn-ea"/>
-              </a:rPr>
-              <a:t>真实感</a:t>
-            </a:r>
-            <a:r>
-              <a:rPr dirty="0">
-                <a:sym typeface="+mn-ea"/>
-              </a:rPr>
-              <a:t>渲染？</a:t>
-            </a:r>
-          </a:p>
-          <a:p>
-            <a:pPr marL="285750" indent="-285750">
-              <a:buFont typeface="Arial" panose="020B0604020202020204" pitchFamily="34" charset="0"/>
-              <a:buChar char="•"/>
-            </a:pPr>
-            <a:endParaRPr lang="zh-CN" altLang="en-US" dirty="0"/>
-          </a:p>
-        </p:txBody>
-      </p:sp>
-      <p:sp>
-        <p:nvSpPr>
-          <p:cNvPr id="3" name="标题 2"/>
-          <p:cNvSpPr>
-            <a:spLocks noGrp="1"/>
-          </p:cNvSpPr>
-          <p:nvPr>
-            <p:ph type="title"/>
-          </p:nvPr>
-        </p:nvSpPr>
-        <p:spPr/>
-        <p:txBody>
-          <a:bodyPr/>
-          <a:lstStyle/>
-          <a:p>
-            <a:r>
-              <a:rPr>
-                <a:sym typeface="+mn-ea"/>
-              </a:rPr>
-              <a:t>回顾课程内容</a:t>
-            </a:r>
-          </a:p>
-        </p:txBody>
-      </p:sp>
-    </p:spTree>
-    <p:custDataLst>
-      <p:tags r:id="rId1"/>
-    </p:custDataLst>
-  </p:cSld>
-  <p:clrMapOvr>
-    <a:masterClrMapping/>
-  </p:clrMapOvr>
-</p:sld>
-</file>
-
 <file path=ppt/slides/slide5.xml><?xml version="1.0" encoding="utf-8"?>
 <p:sld xmlns:a="http://schemas.openxmlformats.org/drawingml/2006/main" xmlns:r="http://schemas.openxmlformats.org/officeDocument/2006/relationships" xmlns:p="http://schemas.openxmlformats.org/presentationml/2006/main">
   <p:cSld>
@@ -11784,13 +12853,13 @@
               <a:buChar char="•"/>
             </a:pPr>
             <a:r>
-              <a:rPr lang="en-US" altLang="zh-CN">
+              <a:rPr lang="en-US" altLang="zh-CN" dirty="0" err="1">
                 <a:sym typeface="+mn-ea"/>
               </a:rPr>
               <a:t>WebGPU</a:t>
             </a:r>
             <a:r>
-              <a:rPr>
+              <a:rPr dirty="0">
                 <a:sym typeface="+mn-ea"/>
               </a:rPr>
               <a:t>是什么？</a:t>
@@ -11802,30 +12871,30 @@
               <a:buChar char="•"/>
             </a:pPr>
             <a:r>
-              <a:rPr lang="en-US" altLang="zh-CN">
+              <a:rPr lang="en-US" altLang="zh-CN" dirty="0">
                 <a:sym typeface="+mn-ea"/>
               </a:rPr>
               <a:t>WebGL</a:t>
             </a:r>
             <a:r>
-              <a:rPr>
+              <a:rPr dirty="0">
                 <a:sym typeface="+mn-ea"/>
               </a:rPr>
               <a:t>和</a:t>
             </a:r>
             <a:r>
-              <a:rPr lang="en-US" altLang="zh-CN">
+              <a:rPr lang="en-US" altLang="zh-CN" dirty="0" err="1">
                 <a:sym typeface="+mn-ea"/>
               </a:rPr>
               <a:t>WebGPU</a:t>
             </a:r>
             <a:r>
-              <a:rPr>
+              <a:rPr dirty="0">
                 <a:sym typeface="+mn-ea"/>
               </a:rPr>
               <a:t>相比有什么区别？</a:t>
             </a:r>
-            <a:endParaRPr lang="zh-CN" altLang="en-US"/>
+            <a:endParaRPr lang="zh-CN" altLang="en-US" dirty="0"/>
           </a:p>
           <a:p>
             <a:pPr marL="285750" lvl="0" indent="-285750">
@@ -11833,19 +12902,19 @@
               <a:buChar char="•"/>
             </a:pPr>
             <a:r>
-              <a:rPr>
+              <a:rPr dirty="0">
                 <a:sym typeface="+mn-ea"/>
               </a:rPr>
               <a:t>如何用</a:t>
             </a:r>
             <a:r>
-              <a:rPr lang="en-US" altLang="zh-CN">
+              <a:rPr lang="en-US" altLang="zh-CN" dirty="0" err="1">
                 <a:sym typeface="+mn-ea"/>
               </a:rPr>
               <a:t>WebGPU</a:t>
             </a:r>
             <a:r>
-              <a:rPr>
+              <a:rPr dirty="0">
                 <a:sym typeface="+mn-ea"/>
               </a:rPr>
               <a:t>绘制一个三角形？</a:t>
@@ -11856,7 +12925,7 @@
               <a:buFont typeface="Arial" panose="020B0604020202020204" pitchFamily="34" charset="0"/>
               <a:buChar char="•"/>
             </a:pPr>
-            <a:endParaRPr lang="zh-CN" altLang="en-US"/>
+            <a:endParaRPr lang="zh-CN" altLang="en-US" dirty="0"/>
           </a:p>
         </p:txBody>
       </p:sp>
@@ -11953,7 +13022,7 @@
                                         <p:tgtEl>
                                           <p:spTgt spid="2">
                                             <p:txEl>
-                                              <p:pRg st="1" end="1"/>
+                                              <p:pRg st="0" end="0"/>
                                             </p:txEl>
                                           </p:spTgt>
                                         </p:tgtEl>
@@ -12002,7 +13071,7 @@
                                         <p:tgtEl>
                                           <p:spTgt spid="2">
                                             <p:txEl>
-                                              <p:pRg st="2" end="2"/>
+                                              <p:pRg st="1" end="1"/>
                                             </p:txEl>
                                           </p:spTgt>
                                         </p:tgtEl>
@@ -12044,6 +13113,55 @@
                                     <p:set>
                                       <p:cBhvr>
                                         <p:cTn id="14" dur="1" fill="hold">
+                                          <p:stCondLst>
+                                            <p:cond delay="0"/>
+                                          </p:stCondLst>
+                                        </p:cTn>
+                                        <p:tgtEl>
+                                          <p:spTgt spid="2">
+                                            <p:txEl>
+                                              <p:pRg st="2" end="2"/>
+                                            </p:txEl>
+                                          </p:spTgt>
+                                        </p:tgtEl>
+                                        <p:attrNameLst>
+                                          <p:attrName>style.visibility</p:attrName>
+                                        </p:attrNameLst>
+                                      </p:cBhvr>
+                                      <p:to>
+                                        <p:strVal val="visible"/>
+                                      </p:to>
+                                    </p:set>
+                                  </p:childTnLst>
+                                </p:cTn>
+                              </p:par>
+                            </p:childTnLst>
+                          </p:cTn>
+                        </p:par>
+                      </p:childTnLst>
+                    </p:cTn>
+                  </p:par>
+                  <p:par>
+                    <p:cTn id="15" fill="hold">
+                      <p:stCondLst>
+                        <p:cond delay="indefinite"/>
+                      </p:stCondLst>
+                      <p:childTnLst>
+                        <p:par>
+                          <p:cTn id="16" fill="hold">
+                            <p:stCondLst>
+                              <p:cond delay="0"/>
+                            </p:stCondLst>
+                            <p:childTnLst>
+                              <p:par>
+                                <p:cTn id="17" presetID="1" presetClass="entr" presetSubtype="0" fill="hold" nodeType="clickEffect">
+                                  <p:stCondLst>
+                                    <p:cond delay="0"/>
+                                  </p:stCondLst>
+                                  <p:childTnLst>
+                                    <p:set>
+                                      <p:cBhvr>
+                                        <p:cTn id="18" dur="1" fill="hold">
                                           <p:stCondLst>
                                             <p:cond delay="0"/>
                                           </p:stCondLst>
@@ -12638,36 +13756,24 @@
           <a:lstStyle/>
           <a:p>
             <a:r>
-              <a:rPr lang="zh-CN" altLang="en-US"/>
+              <a:rPr lang="zh-CN" altLang="en-US" dirty="0"/>
               <a:t>在哪里渲染？</a:t>
             </a:r>
           </a:p>
           <a:p>
             <a:r>
-              <a:rPr lang="zh-CN" altLang="en-US"/>
+              <a:rPr lang="zh-CN" altLang="en-US" dirty="0"/>
               <a:t>有哪些渲染管线？</a:t>
             </a:r>
           </a:p>
           <a:p>
             <a:r>
-              <a:rPr lang="zh-CN" altLang="en-US"/>
+              <a:rPr lang="zh-CN" altLang="en-US" dirty="0"/>
               <a:t>每个渲染管线分别用于什么用途？</a:t>
             </a:r>
           </a:p>
           <a:p>
-            <a:r>
-              <a:rPr lang="zh-CN" altLang="en-US"/>
-              <a:t>为什么需要计算管线？有什么用？</a:t>
-            </a:r>
-          </a:p>
-          <a:p>
-            <a:r>
-              <a:rPr lang="zh-CN" altLang="en-US"/>
-              <a:t>每个渲染管线分别有哪些着色器？</a:t>
-            </a:r>
-          </a:p>
-          <a:p>
-            <a:endParaRPr lang="zh-CN" altLang="en-US"/>
+            <a:endParaRPr lang="zh-CN" altLang="en-US" dirty="0"/>
           </a:p>
         </p:txBody>
       </p:sp>
@@ -12928,104 +14034,6 @@
                       </p:childTnLst>
                     </p:cTn>
                   </p:par>
-                  <p:par>
-                    <p:cTn id="19" fill="hold">
-                      <p:stCondLst>
-                        <p:cond delay="indefinite"/>
-                      </p:stCondLst>
-                      <p:childTnLst>
-                        <p:par>
-                          <p:cTn id="20" fill="hold">
-                            <p:stCondLst>
-                              <p:cond delay="0"/>
-                            </p:stCondLst>
-                            <p:childTnLst>
-                              <p:par>
-                                <p:cTn id="21" presetID="1" presetClass="entr" presetSubtype="0" fill="hold" nodeType="clickEffect">
-                                  <p:stCondLst>
-                                    <p:cond delay="0"/>
-                                  </p:stCondLst>
-                                  <p:childTnLst>
-                                    <p:set>
-                                      <p:cBhvr>
-                                        <p:cTn id="22" dur="1" fill="hold">
-                                          <p:stCondLst>
-                                            <p:cond delay="0"/>
-                                          </p:stCondLst>
-                                        </p:cTn>
-                                        <p:tgtEl>
-                                          <p:spTgt spid="3">
-                                            <p:txEl>
-                                              <p:pRg st="3" end="3"/>
-                                            </p:txEl>
-                                          </p:spTgt>
-                                        </p:tgtEl>
-                                        <p:attrNameLst>
-                                          <p:attrName>style.visibility</p:attrName>
-                                        </p:attrNameLst>
-                                      </p:cBhvr>
-                                      <p:to>
-                                        <p:strVal val="visible"/>
-                                      </p:to>
-                                    </p:set>
-                                  </p:childTnLst>
-                                </p:cTn>
-                              </p:par>
-                            </p:childTnLst>
-                          </p:cTn>
-                        </p:par>
-                      </p:childTnLst>
-                    </p:cTn>
-                  </p:par>
-                  <p:par>
-                    <p:cTn id="23" fill="hold">
-                      <p:stCondLst>
-                        <p:cond delay="indefinite"/>
-                      </p:stCondLst>
-                      <p:childTnLst>
-                        <p:par>
-                          <p:cTn id="24" fill="hold">
-                            <p:stCondLst>
-                              <p:cond delay="0"/>
-                            </p:stCondLst>
-                            <p:childTnLst>
-                              <p:par>
-                                <p:cTn id="25" presetID="1" presetClass="entr" presetSubtype="0" fill="hold" nodeType="clickEffect">
-                                  <p:stCondLst>
-                                    <p:cond delay="0"/>
-                                  </p:stCondLst>
-                                  <p:childTnLst>
-                                    <p:set>
-                                      <p:cBhvr>
-                                        <p:cTn id="26" dur="1" fill="hold">
-                                          <p:stCondLst>
-                                            <p:cond delay="0"/>
-                                          </p:stCondLst>
-                                        </p:cTn>
-                                        <p:tgtEl>
-                                          <p:spTgt spid="3">
-                                            <p:txEl>
-                                              <p:pRg st="4" end="4"/>
-                                            </p:txEl>
-                                          </p:spTgt>
-                                        </p:tgtEl>
-                                        <p:attrNameLst>
-                                          <p:attrName>style.visibility</p:attrName>
-                                        </p:attrNameLst>
-                                      </p:cBhvr>
-                                      <p:to>
-                                        <p:strVal val="visible"/>
-                                      </p:to>
-                                    </p:set>
-                                  </p:childTnLst>
-                                </p:cTn>
-                              </p:par>
-                            </p:childTnLst>
-                          </p:cTn>
-                        </p:par>
-                      </p:childTnLst>
-                    </p:cTn>
-                  </p:par>
                 </p:childTnLst>
               </p:cTn>
               <p:prevCondLst>
@@ -13993,11 +15001,26 @@
   <p:tag name="KSO_WM_BEAUTIFY_FLAG" val="#wm#"/>
   <p:tag name="KSO_WM_TEMPLATE_CATEGORY" val="custom"/>
   <p:tag name="KSO_WM_TEMPLATE_INDEX" val="20187308"/>
-  <p:tag name="KSO_WM_SPECIAL_SOURCE" val="bdnull"/>
 </p:tagLst>
 </file>
 
 <file path=ppt/tags/tag83.xml><?xml version="1.0" encoding="utf-8"?>
+<p:tagLst xmlns:a="http://schemas.openxmlformats.org/drawingml/2006/main" xmlns:r="http://schemas.openxmlformats.org/officeDocument/2006/relationships" xmlns:p="http://schemas.openxmlformats.org/presentationml/2006/main">
+  <p:tag name="KSO_WM_BEAUTIFY_FLAG" val="#wm#"/>
+  <p:tag name="KSO_WM_TEMPLATE_CATEGORY" val="custom"/>
+  <p:tag name="KSO_WM_TEMPLATE_INDEX" val="20187308"/>
+</p:tagLst>
+</file>
+
+<file path=ppt/tags/tag84.xml><?xml version="1.0" encoding="utf-8"?>
+<p:tagLst xmlns:a="http://schemas.openxmlformats.org/drawingml/2006/main" xmlns:r="http://schemas.openxmlformats.org/officeDocument/2006/relationships" xmlns:p="http://schemas.openxmlformats.org/presentationml/2006/main">
+  <p:tag name="KSO_WM_BEAUTIFY_FLAG" val="#wm#"/>
+  <p:tag name="KSO_WM_TEMPLATE_CATEGORY" val="custom"/>
+  <p:tag name="KSO_WM_TEMPLATE_INDEX" val="20187308"/>
+</p:tagLst>
+</file>
+
+<file path=ppt/tags/tag85.xml><?xml version="1.0" encoding="utf-8"?>
 <p:tagLst xmlns:a="http://schemas.openxmlformats.org/drawingml/2006/main" xmlns:r="http://schemas.openxmlformats.org/officeDocument/2006/relationships" xmlns:p="http://schemas.openxmlformats.org/presentationml/2006/main">
   <p:tag name="KSO_WM_BEAUTIFY_FLAG" val="#wm#"/>
   <p:tag name="KSO_WM_TEMPLATE_CATEGORY" val="custom"/>
@@ -14006,7 +15029,7 @@
 </p:tagLst>
 </file>
 
-<file path=ppt/tags/tag84.xml><?xml version="1.0" encoding="utf-8"?>
+<file path=ppt/tags/tag86.xml><?xml version="1.0" encoding="utf-8"?>
 <p:tagLst xmlns:a="http://schemas.openxmlformats.org/drawingml/2006/main" xmlns:r="http://schemas.openxmlformats.org/officeDocument/2006/relationships" xmlns:p="http://schemas.openxmlformats.org/presentationml/2006/main">
   <p:tag name="KSO_WM_BEAUTIFY_FLAG" val="#wm#"/>
   <p:tag name="KSO_WM_TEMPLATE_CATEGORY" val="custom"/>
@@ -14015,18 +15038,6 @@
 </p:tagLst>
 </file>
 
-<file path=ppt/tags/tag85.xml><?xml version="1.0" encoding="utf-8"?>
-<p:tagLst xmlns:a="http://schemas.openxmlformats.org/drawingml/2006/main" xmlns:r="http://schemas.openxmlformats.org/officeDocument/2006/relationships" xmlns:p="http://schemas.openxmlformats.org/presentationml/2006/main">
-  <p:tag name="KSO_WM_SPECIAL_SOURCE" val="bdnull"/>
-</p:tagLst>
-</file>
-
-<file path=ppt/tags/tag86.xml><?xml version="1.0" encoding="utf-8"?>
-<p:tagLst xmlns:a="http://schemas.openxmlformats.org/drawingml/2006/main" xmlns:r="http://schemas.openxmlformats.org/officeDocument/2006/relationships" xmlns:p="http://schemas.openxmlformats.org/presentationml/2006/main">
-  <p:tag name="KSO_WM_UNIT_PLACING_PICTURE_USER_VIEWPORT" val="{&quot;height&quot;:4005,&quot;width&quot;:14715}"/>
-</p:tagLst>
-</file>
-
 <file path=ppt/tags/tag87.xml><?xml version="1.0" encoding="utf-8"?>
 <p:tagLst xmlns:a="http://schemas.openxmlformats.org/drawingml/2006/main" xmlns:r="http://schemas.openxmlformats.org/officeDocument/2006/relationships" xmlns:p="http://schemas.openxmlformats.org/presentationml/2006/main">
   <p:tag name="KSO_WM_SPECIAL_SOURCE" val="bdnull"/>
@@ -14035,7 +15046,7 @@
 
 <file path=ppt/tags/tag88.xml><?xml version="1.0" encoding="utf-8"?>
 <p:tagLst xmlns:a="http://schemas.openxmlformats.org/drawingml/2006/main" xmlns:r="http://schemas.openxmlformats.org/officeDocument/2006/relationships" xmlns:p="http://schemas.openxmlformats.org/presentationml/2006/main">
-  <p:tag name="KSO_WM_SPECIAL_SOURCE" val="bdnull"/>
+  <p:tag name="KSO_WM_UNIT_PLACING_PICTURE_USER_VIEWPORT" val="{&quot;height&quot;:4005,&quot;width&quot;:14715}"/>
 </p:tagLst>
 </file>
 
@@ -14072,9 +15083,6 @@
 
 <file path=ppt/tags/tag91.xml><?xml version="1.0" encoding="utf-8"?>
 <p:tagLst xmlns:a="http://schemas.openxmlformats.org/drawingml/2006/main" xmlns:r="http://schemas.openxmlformats.org/officeDocument/2006/relationships" xmlns:p="http://schemas.openxmlformats.org/presentationml/2006/main">
-  <p:tag name="KSO_WM_BEAUTIFY_FLAG" val="#wm#"/>
-  <p:tag name="KSO_WM_TEMPLATE_CATEGORY" val="custom"/>
-  <p:tag name="KSO_WM_TEMPLATE_INDEX" val="20187308"/>
   <p:tag name="KSO_WM_SPECIAL_SOURCE" val="bdnull"/>
 </p:tagLst>
 </file>
@@ -14116,6 +15124,33 @@
 </file>
 
 <file path=ppt/tags/tag96.xml><?xml version="1.0" encoding="utf-8"?>
+<p:tagLst xmlns:a="http://schemas.openxmlformats.org/drawingml/2006/main" xmlns:r="http://schemas.openxmlformats.org/officeDocument/2006/relationships" xmlns:p="http://schemas.openxmlformats.org/presentationml/2006/main">
+  <p:tag name="KSO_WM_BEAUTIFY_FLAG" val="#wm#"/>
+  <p:tag name="KSO_WM_TEMPLATE_CATEGORY" val="custom"/>
+  <p:tag name="KSO_WM_TEMPLATE_INDEX" val="20187308"/>
+  <p:tag name="KSO_WM_SPECIAL_SOURCE" val="bdnull"/>
+</p:tagLst>
+</file>
+
+<file path=ppt/tags/tag97.xml><?xml version="1.0" encoding="utf-8"?>
+<p:tagLst xmlns:a="http://schemas.openxmlformats.org/drawingml/2006/main" xmlns:r="http://schemas.openxmlformats.org/officeDocument/2006/relationships" xmlns:p="http://schemas.openxmlformats.org/presentationml/2006/main">
+  <p:tag name="KSO_WM_BEAUTIFY_FLAG" val="#wm#"/>
+  <p:tag name="KSO_WM_TEMPLATE_CATEGORY" val="custom"/>
+  <p:tag name="KSO_WM_TEMPLATE_INDEX" val="20187308"/>
+  <p:tag name="KSO_WM_SPECIAL_SOURCE" val="bdnull"/>
+</p:tagLst>
+</file>
+
+<file path=ppt/tags/tag98.xml><?xml version="1.0" encoding="utf-8"?>
+<p:tagLst xmlns:a="http://schemas.openxmlformats.org/drawingml/2006/main" xmlns:r="http://schemas.openxmlformats.org/officeDocument/2006/relationships" xmlns:p="http://schemas.openxmlformats.org/presentationml/2006/main">
+  <p:tag name="KSO_WM_BEAUTIFY_FLAG" val="#wm#"/>
+  <p:tag name="KSO_WM_TEMPLATE_CATEGORY" val="custom"/>
+  <p:tag name="KSO_WM_TEMPLATE_INDEX" val="20187308"/>
+  <p:tag name="KSO_WM_SPECIAL_SOURCE" val="bdnull"/>
+</p:tagLst>
+</file>
+
+<file path=ppt/tags/tag99.xml><?xml version="1.0" encoding="utf-8"?>
 <p:tagLst xmlns:a="http://schemas.openxmlformats.org/drawingml/2006/main" xmlns:r="http://schemas.openxmlformats.org/officeDocument/2006/relationships" xmlns:p="http://schemas.openxmlformats.org/presentationml/2006/main">
   <p:tag name="KSO_WM_BEAUTIFY_FLAG" val="#wm#"/>
   <p:tag name="KSO_WM_TEMPLATE_CATEGORY" val="custom"/>

</xml_diff>